<commit_message>
update collection and presentation
</commit_message>
<xml_diff>
--- a/Aufgabenstellung Connectathon Köln/Track-Fortgeschrittene/ISIK-Köln-Track-Fortgeschrittene.pptx
+++ b/Aufgabenstellung Connectathon Köln/Track-Fortgeschrittene/ISIK-Köln-Track-Fortgeschrittene.pptx
@@ -5,24 +5,28 @@
     <p:sldMasterId id="2147483648" r:id="rId4"/>
   </p:sldMasterIdLst>
   <p:notesMasterIdLst>
-    <p:notesMasterId r:id="rId15"/>
+    <p:notesMasterId r:id="rId19"/>
   </p:notesMasterIdLst>
   <p:sldIdLst>
     <p:sldId id="704" r:id="rId5"/>
     <p:sldId id="743" r:id="rId6"/>
     <p:sldId id="778" r:id="rId7"/>
-    <p:sldId id="796" r:id="rId8"/>
-    <p:sldId id="795" r:id="rId9"/>
-    <p:sldId id="797" r:id="rId10"/>
-    <p:sldId id="799" r:id="rId11"/>
-    <p:sldId id="800" r:id="rId12"/>
-    <p:sldId id="794" r:id="rId13"/>
-    <p:sldId id="781" r:id="rId14"/>
+    <p:sldId id="802" r:id="rId8"/>
+    <p:sldId id="796" r:id="rId9"/>
+    <p:sldId id="795" r:id="rId10"/>
+    <p:sldId id="803" r:id="rId11"/>
+    <p:sldId id="801" r:id="rId12"/>
+    <p:sldId id="797" r:id="rId13"/>
+    <p:sldId id="799" r:id="rId14"/>
+    <p:sldId id="800" r:id="rId15"/>
+    <p:sldId id="804" r:id="rId16"/>
+    <p:sldId id="794" r:id="rId17"/>
+    <p:sldId id="781" r:id="rId18"/>
   </p:sldIdLst>
   <p:sldSz cx="12192000" cy="6858000"/>
   <p:notesSz cx="6858000" cy="9144000"/>
   <p:custDataLst>
-    <p:tags r:id="rId16"/>
+    <p:tags r:id="rId20"/>
   </p:custDataLst>
   <p:defaultTextStyle>
     <a:defPPr>
@@ -268,7 +272,7 @@
           <a:p>
             <a:fld id="{ABA7BCD2-50AA-4B58-90C4-64D00CF94203}" type="datetimeFigureOut">
               <a:rPr lang="de-DE" smtClean="0"/>
-              <a:t>03.12.2024</a:t>
+              <a:t>09.12.2024</a:t>
             </a:fld>
             <a:endParaRPr lang="de-DE"/>
           </a:p>
@@ -884,10 +888,10 @@
             </a:lvl1pPr>
           </a:lstStyle>
           <a:p>
-            <a:fld id="{42D350AD-78C9-457B-B45D-885B5E662633}" type="datetime1">
-              <a:rPr lang="de-DE" smtClean="0"/>
-              <a:t>03.12.2024</a:t>
-            </a:fld>
+            <a:r>
+              <a:rPr lang="de-DE"/>
+              <a:t>10.12.2024</a:t>
+            </a:r>
             <a:endParaRPr lang="de-DE" dirty="0"/>
           </a:p>
         </p:txBody>
@@ -934,7 +938,7 @@
           <a:p>
             <a:r>
               <a:rPr lang="de-DE"/>
-              <a:t>ISiK und Krankenhaus Stakeholder</a:t>
+              <a:t>"Easy ISiK" - Track Fortgeschrittene mit Fokus Dokumentenaustausch</a:t>
             </a:r>
             <a:endParaRPr lang="de-DE" dirty="0"/>
           </a:p>
@@ -1159,10 +1163,10 @@
             </a:lvl1pPr>
           </a:lstStyle>
           <a:p>
-            <a:fld id="{EC71E73A-73A5-4B62-8C9E-D84BA0836E4E}" type="datetime1">
-              <a:rPr lang="de-DE" smtClean="0"/>
-              <a:t>03.12.2024</a:t>
-            </a:fld>
+            <a:r>
+              <a:rPr lang="de-DE"/>
+              <a:t>10.12.2024</a:t>
+            </a:r>
             <a:endParaRPr lang="de-DE" dirty="0"/>
           </a:p>
         </p:txBody>
@@ -1209,7 +1213,7 @@
           <a:p>
             <a:r>
               <a:rPr lang="de-DE"/>
-              <a:t>ISiK und Krankenhaus Stakeholder</a:t>
+              <a:t>"Easy ISiK" - Track Fortgeschrittene mit Fokus Dokumentenaustausch</a:t>
             </a:r>
             <a:endParaRPr lang="de-DE" dirty="0"/>
           </a:p>
@@ -1552,10 +1556,10 @@
             </a:lvl1pPr>
           </a:lstStyle>
           <a:p>
-            <a:fld id="{7070EAAF-6B35-44F7-B6DE-54E02B615ED3}" type="datetime1">
-              <a:rPr lang="de-DE" smtClean="0"/>
-              <a:t>03.12.2024</a:t>
-            </a:fld>
+            <a:r>
+              <a:rPr lang="de-DE"/>
+              <a:t>10.12.2024</a:t>
+            </a:r>
             <a:endParaRPr lang="de-DE" dirty="0"/>
           </a:p>
         </p:txBody>
@@ -1599,7 +1603,7 @@
           <a:p>
             <a:r>
               <a:rPr lang="de-DE"/>
-              <a:t>ISiK und Krankenhaus Stakeholder</a:t>
+              <a:t>"Easy ISiK" - Track Fortgeschrittene mit Fokus Dokumentenaustausch</a:t>
             </a:r>
             <a:endParaRPr lang="de-DE" dirty="0"/>
           </a:p>
@@ -2219,10 +2223,10 @@
             </a:lvl1pPr>
           </a:lstStyle>
           <a:p>
-            <a:fld id="{F457ACCB-56BD-48E1-BD1C-5899FC43C9CA}" type="datetime1">
-              <a:rPr lang="de-DE" smtClean="0"/>
-              <a:t>03.12.2024</a:t>
-            </a:fld>
+            <a:r>
+              <a:rPr lang="de-DE"/>
+              <a:t>10.12.2024</a:t>
+            </a:r>
             <a:endParaRPr lang="de-DE" dirty="0"/>
           </a:p>
         </p:txBody>
@@ -2269,7 +2273,7 @@
           <a:p>
             <a:r>
               <a:rPr lang="de-DE"/>
-              <a:t>ISiK und Krankenhaus Stakeholder</a:t>
+              <a:t>"Easy ISiK" - Track Fortgeschrittene mit Fokus Dokumentenaustausch</a:t>
             </a:r>
             <a:endParaRPr lang="de-DE" dirty="0"/>
           </a:p>
@@ -2527,10 +2531,10 @@
             </a:lvl1pPr>
           </a:lstStyle>
           <a:p>
-            <a:fld id="{20F73E0A-A785-43BB-839F-83CEB32388ED}" type="datetime1">
-              <a:rPr lang="de-DE" smtClean="0"/>
-              <a:t>03.12.2024</a:t>
-            </a:fld>
+            <a:r>
+              <a:rPr lang="de-DE"/>
+              <a:t>10.12.2024</a:t>
+            </a:r>
             <a:endParaRPr lang="de-DE" dirty="0"/>
           </a:p>
         </p:txBody>
@@ -2577,7 +2581,7 @@
           <a:p>
             <a:r>
               <a:rPr lang="de-DE"/>
-              <a:t>ISiK und Krankenhaus Stakeholder</a:t>
+              <a:t>"Easy ISiK" - Track Fortgeschrittene mit Fokus Dokumentenaustausch</a:t>
             </a:r>
             <a:endParaRPr lang="de-DE" dirty="0"/>
           </a:p>
@@ -2865,10 +2869,10 @@
             </a:lvl1pPr>
           </a:lstStyle>
           <a:p>
-            <a:fld id="{84A273FD-4E80-46A5-957C-33F202EBCB12}" type="datetime1">
-              <a:rPr lang="de-DE" smtClean="0"/>
-              <a:t>03.12.2024</a:t>
-            </a:fld>
+            <a:r>
+              <a:rPr lang="de-DE"/>
+              <a:t>10.12.2024</a:t>
+            </a:r>
             <a:endParaRPr lang="de-DE" dirty="0"/>
           </a:p>
         </p:txBody>
@@ -2915,7 +2919,7 @@
           <a:p>
             <a:r>
               <a:rPr lang="de-DE"/>
-              <a:t>ISiK und Krankenhaus Stakeholder</a:t>
+              <a:t>"Easy ISiK" - Track Fortgeschrittene mit Fokus Dokumentenaustausch</a:t>
             </a:r>
             <a:endParaRPr lang="de-DE" dirty="0"/>
           </a:p>
@@ -3587,10 +3591,10 @@
             </a:lvl1pPr>
           </a:lstStyle>
           <a:p>
-            <a:fld id="{5F26CDCE-C324-42F5-9B19-D99D655C8DD2}" type="datetime1">
-              <a:rPr lang="de-DE" smtClean="0"/>
-              <a:t>03.12.2024</a:t>
-            </a:fld>
+            <a:r>
+              <a:rPr lang="de-DE"/>
+              <a:t>10.12.2024</a:t>
+            </a:r>
             <a:endParaRPr lang="de-DE" dirty="0"/>
           </a:p>
         </p:txBody>
@@ -3637,7 +3641,7 @@
           <a:p>
             <a:r>
               <a:rPr lang="de-DE"/>
-              <a:t>ISiK und Krankenhaus Stakeholder</a:t>
+              <a:t>"Easy ISiK" - Track Fortgeschrittene mit Fokus Dokumentenaustausch</a:t>
             </a:r>
             <a:endParaRPr lang="de-DE" dirty="0"/>
           </a:p>
@@ -4312,10 +4316,10 @@
             </a:lvl1pPr>
           </a:lstStyle>
           <a:p>
-            <a:fld id="{230B4BF5-EE5C-4E28-9345-76544B625B71}" type="datetime1">
-              <a:rPr lang="de-DE" smtClean="0"/>
-              <a:t>03.12.2024</a:t>
-            </a:fld>
+            <a:r>
+              <a:rPr lang="de-DE"/>
+              <a:t>10.12.2024</a:t>
+            </a:r>
             <a:endParaRPr lang="de-DE" dirty="0"/>
           </a:p>
         </p:txBody>
@@ -4362,7 +4366,7 @@
           <a:p>
             <a:r>
               <a:rPr lang="de-DE"/>
-              <a:t>ISiK und Krankenhaus Stakeholder</a:t>
+              <a:t>"Easy ISiK" - Track Fortgeschrittene mit Fokus Dokumentenaustausch</a:t>
             </a:r>
             <a:endParaRPr lang="de-DE" dirty="0"/>
           </a:p>
@@ -4935,10 +4939,10 @@
             </a:lvl1pPr>
           </a:lstStyle>
           <a:p>
-            <a:fld id="{D5454C09-E119-4738-9842-A40CA707F1E6}" type="datetime1">
-              <a:rPr lang="de-DE" smtClean="0"/>
-              <a:t>03.12.2024</a:t>
-            </a:fld>
+            <a:r>
+              <a:rPr lang="de-DE"/>
+              <a:t>10.12.2024</a:t>
+            </a:r>
             <a:endParaRPr lang="de-DE" dirty="0"/>
           </a:p>
         </p:txBody>
@@ -4985,7 +4989,7 @@
           <a:p>
             <a:r>
               <a:rPr lang="de-DE"/>
-              <a:t>ISiK und Krankenhaus Stakeholder</a:t>
+              <a:t>"Easy ISiK" - Track Fortgeschrittene mit Fokus Dokumentenaustausch</a:t>
             </a:r>
             <a:endParaRPr lang="de-DE" dirty="0"/>
           </a:p>
@@ -5558,10 +5562,10 @@
             </a:lvl1pPr>
           </a:lstStyle>
           <a:p>
-            <a:fld id="{25F7431C-2307-469D-964D-46D145FA2A27}" type="datetime1">
-              <a:rPr lang="de-DE" smtClean="0"/>
-              <a:t>03.12.2024</a:t>
-            </a:fld>
+            <a:r>
+              <a:rPr lang="de-DE"/>
+              <a:t>10.12.2024</a:t>
+            </a:r>
             <a:endParaRPr lang="de-DE" dirty="0"/>
           </a:p>
         </p:txBody>
@@ -5608,7 +5612,7 @@
           <a:p>
             <a:r>
               <a:rPr lang="de-DE"/>
-              <a:t>ISiK und Krankenhaus Stakeholder</a:t>
+              <a:t>"Easy ISiK" - Track Fortgeschrittene mit Fokus Dokumentenaustausch</a:t>
             </a:r>
             <a:endParaRPr lang="de-DE" dirty="0"/>
           </a:p>
@@ -6131,10 +6135,10 @@
             </a:lvl1pPr>
           </a:lstStyle>
           <a:p>
-            <a:fld id="{6B07B9FB-330C-4FD2-AC49-B6C1D94C908A}" type="datetime1">
-              <a:rPr lang="de-DE" smtClean="0"/>
-              <a:t>03.12.2024</a:t>
-            </a:fld>
+            <a:r>
+              <a:rPr lang="de-DE"/>
+              <a:t>10.12.2024</a:t>
+            </a:r>
             <a:endParaRPr lang="de-DE" dirty="0"/>
           </a:p>
         </p:txBody>
@@ -6181,7 +6185,7 @@
           <a:p>
             <a:r>
               <a:rPr lang="de-DE"/>
-              <a:t>ISiK und Krankenhaus Stakeholder</a:t>
+              <a:t>"Easy ISiK" - Track Fortgeschrittene mit Fokus Dokumentenaustausch</a:t>
             </a:r>
             <a:endParaRPr lang="de-DE" dirty="0"/>
           </a:p>
@@ -6538,10 +6542,10 @@
             </a:lvl1pPr>
           </a:lstStyle>
           <a:p>
-            <a:fld id="{ABB393AD-9432-4B2B-B5B3-C249E0F974D7}" type="datetime1">
-              <a:rPr lang="de-DE" smtClean="0"/>
-              <a:t>03.12.2024</a:t>
-            </a:fld>
+            <a:r>
+              <a:rPr lang="de-DE"/>
+              <a:t>10.12.2024</a:t>
+            </a:r>
             <a:endParaRPr lang="de-DE" dirty="0"/>
           </a:p>
         </p:txBody>
@@ -6588,7 +6592,7 @@
           <a:p>
             <a:r>
               <a:rPr lang="de-DE"/>
-              <a:t>ISiK und Krankenhaus Stakeholder</a:t>
+              <a:t>"Easy ISiK" - Track Fortgeschrittene mit Fokus Dokumentenaustausch</a:t>
             </a:r>
             <a:endParaRPr lang="de-DE" dirty="0"/>
           </a:p>
@@ -6855,10 +6859,10 @@
             </a:lvl1pPr>
           </a:lstStyle>
           <a:p>
-            <a:fld id="{43EC69FA-B8CF-4898-9C16-C3EBE36B0FEB}" type="datetime1">
-              <a:rPr lang="de-DE" smtClean="0"/>
-              <a:t>03.12.2024</a:t>
-            </a:fld>
+            <a:r>
+              <a:rPr lang="de-DE"/>
+              <a:t>10.12.2024</a:t>
+            </a:r>
             <a:endParaRPr lang="de-DE" dirty="0"/>
           </a:p>
         </p:txBody>
@@ -6905,7 +6909,7 @@
           <a:p>
             <a:r>
               <a:rPr lang="de-DE"/>
-              <a:t>ISiK und Krankenhaus Stakeholder</a:t>
+              <a:t>"Easy ISiK" - Track Fortgeschrittene mit Fokus Dokumentenaustausch</a:t>
             </a:r>
             <a:endParaRPr lang="de-DE" dirty="0"/>
           </a:p>
@@ -7139,10 +7143,10 @@
             </a:lvl1pPr>
           </a:lstStyle>
           <a:p>
-            <a:fld id="{3EC7250F-4790-44DE-8010-97DF34F52FDA}" type="datetime1">
-              <a:rPr lang="de-DE" smtClean="0"/>
-              <a:t>03.12.2024</a:t>
-            </a:fld>
+            <a:r>
+              <a:rPr lang="de-DE"/>
+              <a:t>10.12.2024</a:t>
+            </a:r>
             <a:endParaRPr lang="de-DE" dirty="0"/>
           </a:p>
         </p:txBody>
@@ -7189,7 +7193,7 @@
           <a:p>
             <a:r>
               <a:rPr lang="de-DE"/>
-              <a:t>ISiK und Krankenhaus Stakeholder</a:t>
+              <a:t>"Easy ISiK" - Track Fortgeschrittene mit Fokus Dokumentenaustausch</a:t>
             </a:r>
             <a:endParaRPr lang="de-DE" dirty="0"/>
           </a:p>
@@ -7538,10 +7542,10 @@
             </a:lvl1pPr>
           </a:lstStyle>
           <a:p>
-            <a:fld id="{818A2FF5-90A9-474C-A180-32CDAF9F92D8}" type="datetime1">
-              <a:rPr lang="de-DE" smtClean="0"/>
-              <a:t>03.12.2024</a:t>
-            </a:fld>
+            <a:r>
+              <a:rPr lang="de-DE"/>
+              <a:t>10.12.2024</a:t>
+            </a:r>
             <a:endParaRPr lang="de-DE" dirty="0"/>
           </a:p>
         </p:txBody>
@@ -7588,7 +7592,7 @@
           <a:p>
             <a:r>
               <a:rPr lang="de-DE"/>
-              <a:t>ISiK und Krankenhaus Stakeholder</a:t>
+              <a:t>"Easy ISiK" - Track Fortgeschrittene mit Fokus Dokumentenaustausch</a:t>
             </a:r>
             <a:endParaRPr lang="de-DE" dirty="0"/>
           </a:p>
@@ -8302,10 +8306,10 @@
             </a:lvl1pPr>
           </a:lstStyle>
           <a:p>
-            <a:fld id="{F6DD6AD7-05C8-416B-A1E4-6C374EFDB38A}" type="datetime1">
-              <a:rPr lang="de-DE" smtClean="0"/>
-              <a:t>03.12.2024</a:t>
-            </a:fld>
+            <a:r>
+              <a:rPr lang="de-DE"/>
+              <a:t>10.12.2024</a:t>
+            </a:r>
             <a:endParaRPr lang="de-DE" dirty="0"/>
           </a:p>
         </p:txBody>
@@ -8352,7 +8356,7 @@
           <a:p>
             <a:r>
               <a:rPr lang="de-DE"/>
-              <a:t>ISiK und Krankenhaus Stakeholder</a:t>
+              <a:t>"Easy ISiK" - Track Fortgeschrittene mit Fokus Dokumentenaustausch</a:t>
             </a:r>
             <a:endParaRPr lang="de-DE" dirty="0"/>
           </a:p>
@@ -9075,10 +9079,10 @@
             </a:lvl1pPr>
           </a:lstStyle>
           <a:p>
-            <a:fld id="{44025432-286C-4CE0-88BB-4B5E35B78761}" type="datetime1">
-              <a:rPr lang="de-DE" smtClean="0"/>
-              <a:t>03.12.2024</a:t>
-            </a:fld>
+            <a:r>
+              <a:rPr lang="de-DE"/>
+              <a:t>10.12.2024</a:t>
+            </a:r>
             <a:endParaRPr lang="de-DE" dirty="0"/>
           </a:p>
         </p:txBody>
@@ -9125,7 +9129,7 @@
           <a:p>
             <a:r>
               <a:rPr lang="de-DE"/>
-              <a:t>ISiK und Krankenhaus Stakeholder</a:t>
+              <a:t>"Easy ISiK" - Track Fortgeschrittene mit Fokus Dokumentenaustausch</a:t>
             </a:r>
             <a:endParaRPr lang="de-DE" dirty="0"/>
           </a:p>
@@ -9848,10 +9852,10 @@
             </a:lvl1pPr>
           </a:lstStyle>
           <a:p>
-            <a:fld id="{4C077131-0103-4D24-8429-52E865E59EF6}" type="datetime1">
-              <a:rPr lang="de-DE" smtClean="0"/>
-              <a:t>03.12.2024</a:t>
-            </a:fld>
+            <a:r>
+              <a:rPr lang="de-DE"/>
+              <a:t>10.12.2024</a:t>
+            </a:r>
             <a:endParaRPr lang="de-DE" dirty="0"/>
           </a:p>
         </p:txBody>
@@ -9898,7 +9902,7 @@
           <a:p>
             <a:r>
               <a:rPr lang="de-DE"/>
-              <a:t>ISiK und Krankenhaus Stakeholder</a:t>
+              <a:t>"Easy ISiK" - Track Fortgeschrittene mit Fokus Dokumentenaustausch</a:t>
             </a:r>
             <a:endParaRPr lang="de-DE" dirty="0"/>
           </a:p>
@@ -11504,10 +11508,10 @@
             </a:lvl1pPr>
           </a:lstStyle>
           <a:p>
-            <a:fld id="{C00AC554-2F37-45A7-B135-A38966CEBC3E}" type="datetime1">
-              <a:rPr lang="de-DE" smtClean="0"/>
-              <a:t>03.12.2024</a:t>
-            </a:fld>
+            <a:r>
+              <a:rPr lang="de-DE"/>
+              <a:t>10.12.2024</a:t>
+            </a:r>
             <a:endParaRPr lang="de-DE" dirty="0"/>
           </a:p>
         </p:txBody>
@@ -11554,7 +11558,7 @@
           <a:p>
             <a:r>
               <a:rPr lang="de-DE"/>
-              <a:t>ISiK und Krankenhaus Stakeholder</a:t>
+              <a:t>"Easy ISiK" - Track Fortgeschrittene mit Fokus Dokumentenaustausch</a:t>
             </a:r>
             <a:endParaRPr lang="de-DE" dirty="0"/>
           </a:p>
@@ -13375,10 +13379,10 @@
             </a:lvl1pPr>
           </a:lstStyle>
           <a:p>
-            <a:fld id="{A68E7D79-29D2-44C5-BFAE-D84AC259DB1E}" type="datetime1">
-              <a:rPr lang="de-DE" smtClean="0"/>
-              <a:t>03.12.2024</a:t>
-            </a:fld>
+            <a:r>
+              <a:rPr lang="de-DE"/>
+              <a:t>10.12.2024</a:t>
+            </a:r>
             <a:endParaRPr lang="de-DE" dirty="0"/>
           </a:p>
         </p:txBody>
@@ -13425,7 +13429,7 @@
           <a:p>
             <a:r>
               <a:rPr lang="de-DE"/>
-              <a:t>ISiK und Krankenhaus Stakeholder</a:t>
+              <a:t>"Easy ISiK" - Track Fortgeschrittene mit Fokus Dokumentenaustausch</a:t>
             </a:r>
             <a:endParaRPr lang="de-DE" dirty="0"/>
           </a:p>
@@ -14170,10 +14174,10 @@
             </a:lvl1pPr>
           </a:lstStyle>
           <a:p>
-            <a:fld id="{891CD726-7599-4F19-B908-DAC240A66D14}" type="datetime1">
-              <a:rPr lang="de-DE" smtClean="0"/>
-              <a:t>03.12.2024</a:t>
-            </a:fld>
+            <a:r>
+              <a:rPr lang="de-DE"/>
+              <a:t>10.12.2024</a:t>
+            </a:r>
             <a:endParaRPr lang="de-DE" dirty="0"/>
           </a:p>
         </p:txBody>
@@ -14220,7 +14224,7 @@
           <a:p>
             <a:r>
               <a:rPr lang="de-DE"/>
-              <a:t>ISiK und Krankenhaus Stakeholder</a:t>
+              <a:t>"Easy ISiK" - Track Fortgeschrittene mit Fokus Dokumentenaustausch</a:t>
             </a:r>
             <a:endParaRPr lang="de-DE" dirty="0"/>
           </a:p>
@@ -14961,10 +14965,10 @@
             </a:lvl1pPr>
           </a:lstStyle>
           <a:p>
-            <a:fld id="{2475DE3D-0E48-4E59-8FE7-31D0EBEDC4FA}" type="datetime1">
-              <a:rPr lang="de-DE" smtClean="0"/>
-              <a:t>03.12.2024</a:t>
-            </a:fld>
+            <a:r>
+              <a:rPr lang="de-DE"/>
+              <a:t>10.12.2024</a:t>
+            </a:r>
             <a:endParaRPr lang="de-DE" dirty="0"/>
           </a:p>
         </p:txBody>
@@ -15011,7 +15015,7 @@
           <a:p>
             <a:r>
               <a:rPr lang="de-DE"/>
-              <a:t>ISiK und Krankenhaus Stakeholder</a:t>
+              <a:t>"Easy ISiK" - Track Fortgeschrittene mit Fokus Dokumentenaustausch</a:t>
             </a:r>
             <a:endParaRPr lang="de-DE" dirty="0"/>
           </a:p>
@@ -15930,10 +15934,10 @@
             </a:lvl1pPr>
           </a:lstStyle>
           <a:p>
-            <a:fld id="{90E59CE2-02DC-4196-A467-1A9967BB8EDE}" type="datetime1">
-              <a:rPr lang="de-DE" smtClean="0"/>
-              <a:t>03.12.2024</a:t>
-            </a:fld>
+            <a:r>
+              <a:rPr lang="de-DE"/>
+              <a:t>10.12.2024</a:t>
+            </a:r>
             <a:endParaRPr lang="de-DE" dirty="0"/>
           </a:p>
         </p:txBody>
@@ -15980,7 +15984,7 @@
           <a:p>
             <a:r>
               <a:rPr lang="de-DE"/>
-              <a:t>ISiK und Krankenhaus Stakeholder</a:t>
+              <a:t>"Easy ISiK" - Track Fortgeschrittene mit Fokus Dokumentenaustausch</a:t>
             </a:r>
             <a:endParaRPr lang="de-DE" dirty="0"/>
           </a:p>
@@ -17999,10 +18003,10 @@
             </a:lvl1pPr>
           </a:lstStyle>
           <a:p>
-            <a:fld id="{71A29148-D6A0-4DCE-BF21-D110266E9F3E}" type="datetime1">
-              <a:rPr lang="de-DE" smtClean="0"/>
-              <a:t>03.12.2024</a:t>
-            </a:fld>
+            <a:r>
+              <a:rPr lang="de-DE"/>
+              <a:t>10.12.2024</a:t>
+            </a:r>
             <a:endParaRPr lang="de-DE" dirty="0"/>
           </a:p>
         </p:txBody>
@@ -18049,7 +18053,7 @@
           <a:p>
             <a:r>
               <a:rPr lang="de-DE"/>
-              <a:t>ISiK und Krankenhaus Stakeholder</a:t>
+              <a:t>"Easy ISiK" - Track Fortgeschrittene mit Fokus Dokumentenaustausch</a:t>
             </a:r>
             <a:endParaRPr lang="de-DE" dirty="0"/>
           </a:p>
@@ -20347,10 +20351,10 @@
             </a:lvl1pPr>
           </a:lstStyle>
           <a:p>
-            <a:fld id="{CCCB2CF3-1E43-4167-8CED-17786D37C7FF}" type="datetime1">
-              <a:rPr lang="de-DE" smtClean="0"/>
-              <a:t>03.12.2024</a:t>
-            </a:fld>
+            <a:r>
+              <a:rPr lang="de-DE"/>
+              <a:t>10.12.2024</a:t>
+            </a:r>
             <a:endParaRPr lang="de-DE" dirty="0"/>
           </a:p>
         </p:txBody>
@@ -20397,7 +20401,7 @@
           <a:p>
             <a:r>
               <a:rPr lang="de-DE"/>
-              <a:t>ISiK und Krankenhaus Stakeholder</a:t>
+              <a:t>"Easy ISiK" - Track Fortgeschrittene mit Fokus Dokumentenaustausch</a:t>
             </a:r>
             <a:endParaRPr lang="de-DE" dirty="0"/>
           </a:p>
@@ -21580,10 +21584,10 @@
             </a:lvl1pPr>
           </a:lstStyle>
           <a:p>
-            <a:fld id="{71452BAA-1DAD-4FD5-A84A-F5371D104C24}" type="datetime1">
-              <a:rPr lang="de-DE" smtClean="0"/>
-              <a:t>03.12.2024</a:t>
-            </a:fld>
+            <a:r>
+              <a:rPr lang="de-DE"/>
+              <a:t>10.12.2024</a:t>
+            </a:r>
             <a:endParaRPr lang="de-DE" dirty="0"/>
           </a:p>
         </p:txBody>
@@ -21630,7 +21634,7 @@
           <a:p>
             <a:r>
               <a:rPr lang="de-DE"/>
-              <a:t>ISiK und Krankenhaus Stakeholder</a:t>
+              <a:t>"Easy ISiK" - Track Fortgeschrittene mit Fokus Dokumentenaustausch</a:t>
             </a:r>
             <a:endParaRPr lang="de-DE" dirty="0"/>
           </a:p>
@@ -21896,10 +21900,10 @@
             </a:lvl1pPr>
           </a:lstStyle>
           <a:p>
-            <a:fld id="{AFC306B1-8D0C-41AB-B7FB-9D2F9ECE2AA8}" type="datetime1">
-              <a:rPr lang="de-DE" smtClean="0"/>
-              <a:t>03.12.2024</a:t>
-            </a:fld>
+            <a:r>
+              <a:rPr lang="de-DE"/>
+              <a:t>10.12.2024</a:t>
+            </a:r>
             <a:endParaRPr lang="de-DE" dirty="0"/>
           </a:p>
         </p:txBody>
@@ -21938,7 +21942,7 @@
           <a:p>
             <a:r>
               <a:rPr lang="de-DE"/>
-              <a:t>ISiK und Krankenhaus Stakeholder</a:t>
+              <a:t>"Easy ISiK" - Track Fortgeschrittene mit Fokus Dokumentenaustausch</a:t>
             </a:r>
             <a:endParaRPr lang="de-DE" dirty="0"/>
           </a:p>
@@ -22115,10 +22119,10 @@
             </a:lvl1pPr>
           </a:lstStyle>
           <a:p>
-            <a:fld id="{31F23A1E-8C83-489D-9467-7EDC00FEBAEA}" type="datetime1">
-              <a:rPr lang="de-DE" smtClean="0"/>
-              <a:t>03.12.2024</a:t>
-            </a:fld>
+            <a:r>
+              <a:rPr lang="de-DE"/>
+              <a:t>10.12.2024</a:t>
+            </a:r>
             <a:endParaRPr lang="de-DE" dirty="0"/>
           </a:p>
         </p:txBody>
@@ -22165,7 +22169,7 @@
           <a:p>
             <a:r>
               <a:rPr lang="de-DE"/>
-              <a:t>ISiK und Krankenhaus Stakeholder</a:t>
+              <a:t>"Easy ISiK" - Track Fortgeschrittene mit Fokus Dokumentenaustausch</a:t>
             </a:r>
             <a:endParaRPr lang="de-DE" dirty="0"/>
           </a:p>
@@ -22601,10 +22605,10 @@
             </a:lvl1pPr>
           </a:lstStyle>
           <a:p>
-            <a:fld id="{2F3F624E-5164-4FC7-BAD1-AC5064DF5C18}" type="datetime1">
-              <a:rPr lang="de-DE" smtClean="0"/>
-              <a:t>03.12.2024</a:t>
-            </a:fld>
+            <a:r>
+              <a:rPr lang="de-DE"/>
+              <a:t>10.12.2024</a:t>
+            </a:r>
             <a:endParaRPr lang="de-DE" dirty="0"/>
           </a:p>
         </p:txBody>
@@ -22651,7 +22655,7 @@
           <a:p>
             <a:r>
               <a:rPr lang="de-DE"/>
-              <a:t>ISiK und Krankenhaus Stakeholder</a:t>
+              <a:t>"Easy ISiK" - Track Fortgeschrittene mit Fokus Dokumentenaustausch</a:t>
             </a:r>
             <a:endParaRPr lang="de-DE" dirty="0"/>
           </a:p>
@@ -23187,10 +23191,10 @@
             </a:lvl1pPr>
           </a:lstStyle>
           <a:p>
-            <a:fld id="{116697F2-57F7-4318-A3F5-D50E9BA78D05}" type="datetime1">
-              <a:rPr lang="de-DE" smtClean="0"/>
-              <a:t>03.12.2024</a:t>
-            </a:fld>
+            <a:r>
+              <a:rPr lang="de-DE"/>
+              <a:t>10.12.2024</a:t>
+            </a:r>
             <a:endParaRPr lang="de-DE" dirty="0"/>
           </a:p>
         </p:txBody>
@@ -23229,7 +23233,7 @@
           <a:p>
             <a:r>
               <a:rPr lang="de-DE"/>
-              <a:t>ISiK und Krankenhaus Stakeholder</a:t>
+              <a:t>"Easy ISiK" - Track Fortgeschrittene mit Fokus Dokumentenaustausch</a:t>
             </a:r>
             <a:endParaRPr lang="de-DE" dirty="0"/>
           </a:p>
@@ -23683,10 +23687,10 @@
             </a:lvl1pPr>
           </a:lstStyle>
           <a:p>
-            <a:fld id="{B956D046-4590-4949-86E3-DB2CC6E02D3D}" type="datetime1">
-              <a:rPr lang="de-DE" smtClean="0"/>
-              <a:t>03.12.2024</a:t>
-            </a:fld>
+            <a:r>
+              <a:rPr lang="de-DE"/>
+              <a:t>10.12.2024</a:t>
+            </a:r>
             <a:endParaRPr lang="de-DE" dirty="0"/>
           </a:p>
         </p:txBody>
@@ -23733,7 +23737,7 @@
           <a:p>
             <a:r>
               <a:rPr lang="de-DE"/>
-              <a:t>ISiK und Krankenhaus Stakeholder</a:t>
+              <a:t>"Easy ISiK" - Track Fortgeschrittene mit Fokus Dokumentenaustausch</a:t>
             </a:r>
             <a:endParaRPr lang="de-DE" dirty="0"/>
           </a:p>
@@ -24171,10 +24175,10 @@
             </a:lvl1pPr>
           </a:lstStyle>
           <a:p>
-            <a:fld id="{4F703ABC-0462-439B-8A12-77C3637F7948}" type="datetime1">
-              <a:rPr lang="de-DE" smtClean="0"/>
-              <a:t>03.12.2024</a:t>
-            </a:fld>
+            <a:r>
+              <a:rPr lang="de-DE"/>
+              <a:t>10.12.2024</a:t>
+            </a:r>
             <a:endParaRPr lang="de-DE" dirty="0"/>
           </a:p>
         </p:txBody>
@@ -24221,7 +24225,7 @@
           <a:p>
             <a:r>
               <a:rPr lang="de-DE"/>
-              <a:t>ISiK und Krankenhaus Stakeholder</a:t>
+              <a:t>"Easy ISiK" - Track Fortgeschrittene mit Fokus Dokumentenaustausch</a:t>
             </a:r>
             <a:endParaRPr lang="de-DE" dirty="0"/>
           </a:p>
@@ -25312,10 +25316,10 @@
             </a:lvl1pPr>
           </a:lstStyle>
           <a:p>
-            <a:fld id="{0100B23E-E76C-48E9-A302-28F43C089F89}" type="datetime1">
-              <a:rPr lang="de-DE" smtClean="0"/>
-              <a:t>03.12.2024</a:t>
-            </a:fld>
+            <a:r>
+              <a:rPr lang="de-DE"/>
+              <a:t>10.12.2024</a:t>
+            </a:r>
             <a:endParaRPr lang="de-DE" dirty="0"/>
           </a:p>
         </p:txBody>
@@ -25362,7 +25366,7 @@
           <a:p>
             <a:r>
               <a:rPr lang="de-DE"/>
-              <a:t>ISiK und Krankenhaus Stakeholder</a:t>
+              <a:t>"Easy ISiK" - Track Fortgeschrittene mit Fokus Dokumentenaustausch</a:t>
             </a:r>
             <a:endParaRPr lang="de-DE" dirty="0"/>
           </a:p>
@@ -26363,10 +26367,10 @@
             </a:lvl1pPr>
           </a:lstStyle>
           <a:p>
-            <a:fld id="{F2EA869A-36B1-454D-8998-D0EF9405AD82}" type="datetime1">
-              <a:rPr lang="de-DE" smtClean="0"/>
-              <a:t>03.12.2024</a:t>
-            </a:fld>
+            <a:r>
+              <a:rPr lang="de-DE"/>
+              <a:t>10.12.2024</a:t>
+            </a:r>
             <a:endParaRPr lang="de-DE" dirty="0"/>
           </a:p>
         </p:txBody>
@@ -26413,7 +26417,7 @@
           <a:p>
             <a:r>
               <a:rPr lang="de-DE"/>
-              <a:t>ISiK und Krankenhaus Stakeholder</a:t>
+              <a:t>"Easy ISiK" - Track Fortgeschrittene mit Fokus Dokumentenaustausch</a:t>
             </a:r>
             <a:endParaRPr lang="de-DE" dirty="0"/>
           </a:p>
@@ -26658,10 +26662,10 @@
             </a:lvl1pPr>
           </a:lstStyle>
           <a:p>
-            <a:fld id="{0418F951-9A56-404A-A4F3-A955C0245712}" type="datetime1">
-              <a:rPr lang="de-DE" smtClean="0"/>
-              <a:t>03.12.2024</a:t>
-            </a:fld>
+            <a:r>
+              <a:rPr lang="de-DE"/>
+              <a:t>10.12.2024</a:t>
+            </a:r>
             <a:endParaRPr lang="de-DE" dirty="0"/>
           </a:p>
         </p:txBody>
@@ -26708,7 +26712,7 @@
           <a:p>
             <a:r>
               <a:rPr lang="de-DE"/>
-              <a:t>ISiK und Krankenhaus Stakeholder</a:t>
+              <a:t>"Easy ISiK" - Track Fortgeschrittene mit Fokus Dokumentenaustausch</a:t>
             </a:r>
             <a:endParaRPr lang="de-DE" dirty="0"/>
           </a:p>
@@ -27039,10 +27043,10 @@
             </a:lvl1pPr>
           </a:lstStyle>
           <a:p>
-            <a:fld id="{D5BA63D8-61A4-4B19-8C12-6FBA491B7561}" type="datetime1">
-              <a:rPr lang="de-DE" smtClean="0"/>
-              <a:t>03.12.2024</a:t>
-            </a:fld>
+            <a:r>
+              <a:rPr lang="de-DE"/>
+              <a:t>10.12.2024</a:t>
+            </a:r>
             <a:endParaRPr lang="de-DE" dirty="0"/>
           </a:p>
         </p:txBody>
@@ -27083,7 +27087,7 @@
           <a:p>
             <a:r>
               <a:rPr lang="de-DE"/>
-              <a:t>ISiK und Krankenhaus Stakeholder</a:t>
+              <a:t>"Easy ISiK" - Track Fortgeschrittene mit Fokus Dokumentenaustausch</a:t>
             </a:r>
             <a:endParaRPr lang="de-DE" dirty="0"/>
           </a:p>
@@ -27739,7 +27743,7 @@
           <p:cNvPr id="2" name="Titel 1">
             <a:extLst>
               <a:ext uri="{FF2B5EF4-FFF2-40B4-BE49-F238E27FC236}">
-                <a16:creationId xmlns:a16="http://schemas.microsoft.com/office/drawing/2014/main" id="{5B054580-D7BE-7C41-8721-D228C9A5D013}"/>
+                <a16:creationId xmlns:a16="http://schemas.microsoft.com/office/drawing/2014/main" id="{C74B19DF-3D5E-824B-42C2-DEC24B0F6F92}"/>
               </a:ext>
             </a:extLst>
           </p:cNvPr>
@@ -27757,37 +27761,29 @@
           <a:p>
             <a:r>
               <a:rPr lang="de-DE" dirty="0" err="1"/>
-              <a:t>gematik</a:t>
-            </a:r>
-            <a:r>
-              <a:rPr lang="de-DE" dirty="0"/>
-              <a:t>.</a:t>
-            </a:r>
-            <a:br>
-              <a:rPr lang="de-DE" b="0" dirty="0"/>
-            </a:br>
-            <a:r>
-              <a:rPr lang="de-DE" dirty="0"/>
-              <a:t>Gesunde Aussichten.</a:t>
-            </a:r>
-            <a:endParaRPr lang="de-DE" b="0" dirty="0"/>
-          </a:p>
-        </p:txBody>
-      </p:sp>
-      <p:sp>
-        <p:nvSpPr>
-          <p:cNvPr id="5" name="Datumsplatzhalter 4">
-            <a:extLst>
-              <a:ext uri="{FF2B5EF4-FFF2-40B4-BE49-F238E27FC236}">
-                <a16:creationId xmlns:a16="http://schemas.microsoft.com/office/drawing/2014/main" id="{96EDE2D6-A878-A943-B86E-D5974A4EFA13}"/>
-              </a:ext>
-            </a:extLst>
-          </p:cNvPr>
-          <p:cNvSpPr>
-            <a:spLocks noGrp="1"/>
-          </p:cNvSpPr>
-          <p:nvPr>
-            <p:ph type="dt" sz="half" idx="10"/>
+              <a:t>Connectathon</a:t>
+            </a:r>
+            <a:r>
+              <a:rPr lang="de-DE" dirty="0"/>
+              <a:t> – Wie komme ich an den Content?</a:t>
+            </a:r>
+          </a:p>
+        </p:txBody>
+      </p:sp>
+      <p:sp>
+        <p:nvSpPr>
+          <p:cNvPr id="3" name="Textplatzhalter 2">
+            <a:extLst>
+              <a:ext uri="{FF2B5EF4-FFF2-40B4-BE49-F238E27FC236}">
+                <a16:creationId xmlns:a16="http://schemas.microsoft.com/office/drawing/2014/main" id="{163DD1D4-2F3A-7326-BCA4-3FCA65393C0B}"/>
+              </a:ext>
+            </a:extLst>
+          </p:cNvPr>
+          <p:cNvSpPr>
+            <a:spLocks noGrp="1"/>
+          </p:cNvSpPr>
+          <p:nvPr>
+            <p:ph type="body" sz="quarter" idx="10"/>
           </p:nvPr>
         </p:nvSpPr>
         <p:spPr/>
@@ -27795,28 +27791,40 @@
           <a:bodyPr/>
           <a:lstStyle/>
           <a:p>
-            <a:fld id="{E2FEB4E4-0B42-4F2E-884C-342A8F77D481}" type="datetime1">
-              <a:rPr lang="de-DE" smtClean="0"/>
-              <a:t>03.12.2024</a:t>
-            </a:fld>
+            <a:r>
+              <a:rPr lang="de-DE" dirty="0" err="1"/>
+              <a:t>Powerpoint</a:t>
+            </a:r>
             <a:endParaRPr lang="de-DE" dirty="0"/>
           </a:p>
-        </p:txBody>
-      </p:sp>
-      <p:sp>
-        <p:nvSpPr>
-          <p:cNvPr id="3" name="Fußzeilenplatzhalter 2">
-            <a:extLst>
-              <a:ext uri="{FF2B5EF4-FFF2-40B4-BE49-F238E27FC236}">
-                <a16:creationId xmlns:a16="http://schemas.microsoft.com/office/drawing/2014/main" id="{036AFD21-19BB-5644-85A6-38962CB47FC4}"/>
-              </a:ext>
-            </a:extLst>
-          </p:cNvPr>
-          <p:cNvSpPr>
-            <a:spLocks noGrp="1"/>
-          </p:cNvSpPr>
-          <p:nvPr>
-            <p:ph type="ftr" sz="quarter" idx="11"/>
+          <a:p>
+            <a:r>
+              <a:rPr lang="de-DE" dirty="0"/>
+              <a:t>Aufgaben</a:t>
+            </a:r>
+          </a:p>
+          <a:p>
+            <a:r>
+              <a:rPr lang="de-DE" dirty="0"/>
+              <a:t>Postman-Collection</a:t>
+            </a:r>
+          </a:p>
+        </p:txBody>
+      </p:sp>
+      <p:sp>
+        <p:nvSpPr>
+          <p:cNvPr id="4" name="Datumsplatzhalter 3">
+            <a:extLst>
+              <a:ext uri="{FF2B5EF4-FFF2-40B4-BE49-F238E27FC236}">
+                <a16:creationId xmlns:a16="http://schemas.microsoft.com/office/drawing/2014/main" id="{9892A8FC-280C-5EB1-BB21-A20DAB295F09}"/>
+              </a:ext>
+            </a:extLst>
+          </p:cNvPr>
+          <p:cNvSpPr>
+            <a:spLocks noGrp="1"/>
+          </p:cNvSpPr>
+          <p:nvPr>
+            <p:ph type="dt" sz="half" idx="2"/>
           </p:nvPr>
         </p:nvSpPr>
         <p:spPr/>
@@ -27826,7 +27834,7 @@
           <a:p>
             <a:r>
               <a:rPr lang="de-DE"/>
-              <a:t>ISiK und Krankenhaus Stakeholder</a:t>
+              <a:t>10.12.2024</a:t>
             </a:r>
             <a:endParaRPr lang="de-DE" dirty="0"/>
           </a:p>
@@ -27834,18 +27842,18 @@
       </p:sp>
       <p:sp>
         <p:nvSpPr>
-          <p:cNvPr id="6" name="Textplatzhalter 5">
-            <a:extLst>
-              <a:ext uri="{FF2B5EF4-FFF2-40B4-BE49-F238E27FC236}">
-                <a16:creationId xmlns:a16="http://schemas.microsoft.com/office/drawing/2014/main" id="{FD314ECE-AA79-8741-A87F-4238A32DD079}"/>
-              </a:ext>
-            </a:extLst>
-          </p:cNvPr>
-          <p:cNvSpPr>
-            <a:spLocks noGrp="1"/>
-          </p:cNvSpPr>
-          <p:nvPr>
-            <p:ph type="body" sz="quarter" idx="14"/>
+          <p:cNvPr id="5" name="Fußzeilenplatzhalter 4">
+            <a:extLst>
+              <a:ext uri="{FF2B5EF4-FFF2-40B4-BE49-F238E27FC236}">
+                <a16:creationId xmlns:a16="http://schemas.microsoft.com/office/drawing/2014/main" id="{8ED58104-E56C-BF4D-48DB-F532992B8501}"/>
+              </a:ext>
+            </a:extLst>
+          </p:cNvPr>
+          <p:cNvSpPr>
+            <a:spLocks noGrp="1"/>
+          </p:cNvSpPr>
+          <p:nvPr>
+            <p:ph type="ftr" sz="quarter" idx="3"/>
           </p:nvPr>
         </p:nvSpPr>
         <p:spPr/>
@@ -27854,73 +27862,27 @@
           <a:lstStyle/>
           <a:p>
             <a:r>
-              <a:rPr lang="de-DE" dirty="0"/>
-              <a:t>Team Data – </a:t>
-            </a:r>
-            <a:r>
-              <a:rPr lang="de-DE" dirty="0" err="1"/>
-              <a:t>ISiK</a:t>
+              <a:rPr lang="de-DE"/>
+              <a:t>"Easy ISiK" - Track Fortgeschrittene mit Fokus Dokumentenaustausch</a:t>
             </a:r>
             <a:endParaRPr lang="de-DE" dirty="0"/>
           </a:p>
-          <a:p>
-            <a:endParaRPr lang="de-DE" dirty="0"/>
-          </a:p>
-        </p:txBody>
-      </p:sp>
-      <p:sp>
-        <p:nvSpPr>
-          <p:cNvPr id="7" name="Textplatzhalter 6">
-            <a:extLst>
-              <a:ext uri="{FF2B5EF4-FFF2-40B4-BE49-F238E27FC236}">
-                <a16:creationId xmlns:a16="http://schemas.microsoft.com/office/drawing/2014/main" id="{B86DDB65-BCC3-8745-8EC6-47D4E048C438}"/>
-              </a:ext>
-            </a:extLst>
-          </p:cNvPr>
-          <p:cNvSpPr>
-            <a:spLocks noGrp="1"/>
-          </p:cNvSpPr>
-          <p:nvPr>
-            <p:ph type="body" sz="quarter" idx="15"/>
-          </p:nvPr>
-        </p:nvSpPr>
-        <p:spPr>
-          <a:xfrm>
-            <a:off x="554038" y="4969565"/>
-            <a:ext cx="7185524" cy="1053548"/>
-          </a:xfrm>
-        </p:spPr>
-        <p:txBody>
-          <a:bodyPr/>
-          <a:lstStyle/>
-          <a:p>
-            <a:r>
-              <a:rPr lang="de-DE" dirty="0"/>
-              <a:t>Weitere Anfragen bitte an :</a:t>
-            </a:r>
-          </a:p>
-          <a:p>
-            <a:r>
-              <a:rPr lang="de-DE" dirty="0"/>
-              <a:t>https://service.gematik.de/servicedesk/customer/portal/16 </a:t>
-            </a:r>
-          </a:p>
-          <a:p>
-            <a:endParaRPr lang="de-DE" dirty="0"/>
-          </a:p>
-          <a:p>
-            <a:endParaRPr lang="de-DE" dirty="0"/>
-          </a:p>
-        </p:txBody>
-      </p:sp>
-      <p:sp>
-        <p:nvSpPr>
-          <p:cNvPr id="4" name="Foliennummernplatzhalter 3"/>
-          <p:cNvSpPr>
-            <a:spLocks noGrp="1"/>
-          </p:cNvSpPr>
-          <p:nvPr>
-            <p:ph type="sldNum" sz="quarter" idx="12"/>
+        </p:txBody>
+      </p:sp>
+      <p:sp>
+        <p:nvSpPr>
+          <p:cNvPr id="6" name="Foliennummernplatzhalter 5">
+            <a:extLst>
+              <a:ext uri="{FF2B5EF4-FFF2-40B4-BE49-F238E27FC236}">
+                <a16:creationId xmlns:a16="http://schemas.microsoft.com/office/drawing/2014/main" id="{D258A4C3-CAA1-9D86-BE28-1DA727070B78}"/>
+              </a:ext>
+            </a:extLst>
+          </p:cNvPr>
+          <p:cNvSpPr>
+            <a:spLocks noGrp="1"/>
+          </p:cNvSpPr>
+          <p:nvPr>
+            <p:ph type="sldNum" sz="quarter" idx="4"/>
           </p:nvPr>
         </p:nvSpPr>
         <p:spPr/>
@@ -27932,6 +27894,1013 @@
               <a:rPr lang="de-DE" smtClean="0"/>
               <a:pPr/>
               <a:t>10</a:t>
+            </a:fld>
+            <a:endParaRPr lang="de-DE" dirty="0"/>
+          </a:p>
+        </p:txBody>
+      </p:sp>
+    </p:spTree>
+    <p:extLst>
+      <p:ext uri="{BB962C8B-B14F-4D97-AF65-F5344CB8AC3E}">
+        <p14:creationId xmlns:p14="http://schemas.microsoft.com/office/powerpoint/2010/main" val="2998839140"/>
+      </p:ext>
+    </p:extLst>
+  </p:cSld>
+  <p:clrMapOvr>
+    <a:masterClrMapping/>
+  </p:clrMapOvr>
+</p:sld>
+</file>
+
+<file path=ppt/slides/slide11.xml><?xml version="1.0" encoding="utf-8"?>
+<p:sld xmlns:a="http://schemas.openxmlformats.org/drawingml/2006/main" xmlns:r="http://schemas.openxmlformats.org/officeDocument/2006/relationships" xmlns:p="http://schemas.openxmlformats.org/presentationml/2006/main">
+  <p:cSld>
+    <p:spTree>
+      <p:nvGrpSpPr>
+        <p:cNvPr id="1" name="">
+          <a:extLst>
+            <a:ext uri="{FF2B5EF4-FFF2-40B4-BE49-F238E27FC236}">
+              <a16:creationId xmlns:a16="http://schemas.microsoft.com/office/drawing/2014/main" id="{43401B72-5419-3196-00C9-915AC941F7DD}"/>
+            </a:ext>
+          </a:extLst>
+        </p:cNvPr>
+        <p:cNvGrpSpPr/>
+        <p:nvPr/>
+      </p:nvGrpSpPr>
+      <p:grpSpPr>
+        <a:xfrm>
+          <a:off x="0" y="0"/>
+          <a:ext cx="0" cy="0"/>
+          <a:chOff x="0" y="0"/>
+          <a:chExt cx="0" cy="0"/>
+        </a:xfrm>
+      </p:grpSpPr>
+      <p:sp>
+        <p:nvSpPr>
+          <p:cNvPr id="5" name="Titel 4">
+            <a:extLst>
+              <a:ext uri="{FF2B5EF4-FFF2-40B4-BE49-F238E27FC236}">
+                <a16:creationId xmlns:a16="http://schemas.microsoft.com/office/drawing/2014/main" id="{FE111779-F787-A345-7D81-95CE56CC6529}"/>
+              </a:ext>
+            </a:extLst>
+          </p:cNvPr>
+          <p:cNvSpPr>
+            <a:spLocks noGrp="1"/>
+          </p:cNvSpPr>
+          <p:nvPr>
+            <p:ph type="title"/>
+          </p:nvPr>
+        </p:nvSpPr>
+        <p:spPr/>
+        <p:txBody>
+          <a:bodyPr/>
+          <a:lstStyle/>
+          <a:p>
+            <a:r>
+              <a:rPr lang="de-DE" dirty="0" err="1"/>
+              <a:t>Connectathon</a:t>
+            </a:r>
+            <a:r>
+              <a:rPr lang="de-DE" dirty="0"/>
+              <a:t> – Wie komme ich an den Content?</a:t>
+            </a:r>
+          </a:p>
+        </p:txBody>
+      </p:sp>
+      <p:sp>
+        <p:nvSpPr>
+          <p:cNvPr id="3" name="Textplatzhalter 2">
+            <a:extLst>
+              <a:ext uri="{FF2B5EF4-FFF2-40B4-BE49-F238E27FC236}">
+                <a16:creationId xmlns:a16="http://schemas.microsoft.com/office/drawing/2014/main" id="{5B099480-3A8E-107A-FF77-E34E5EC111BD}"/>
+              </a:ext>
+            </a:extLst>
+          </p:cNvPr>
+          <p:cNvSpPr>
+            <a:spLocks noGrp="1"/>
+          </p:cNvSpPr>
+          <p:nvPr>
+            <p:ph type="body" sz="quarter" idx="10"/>
+          </p:nvPr>
+        </p:nvSpPr>
+        <p:spPr>
+          <a:xfrm>
+            <a:off x="542924" y="1851252"/>
+            <a:ext cx="8384945" cy="3365500"/>
+          </a:xfrm>
+        </p:spPr>
+        <p:txBody>
+          <a:bodyPr/>
+          <a:lstStyle/>
+          <a:p>
+            <a:pPr lvl="1"/>
+            <a:endParaRPr lang="de-DE" dirty="0"/>
+          </a:p>
+          <a:p>
+            <a:endParaRPr lang="de-DE" dirty="0"/>
+          </a:p>
+          <a:p>
+            <a:endParaRPr lang="de-DE" dirty="0"/>
+          </a:p>
+        </p:txBody>
+      </p:sp>
+      <p:sp>
+        <p:nvSpPr>
+          <p:cNvPr id="13" name="Datumsplatzhalter 12">
+            <a:extLst>
+              <a:ext uri="{FF2B5EF4-FFF2-40B4-BE49-F238E27FC236}">
+                <a16:creationId xmlns:a16="http://schemas.microsoft.com/office/drawing/2014/main" id="{2579B740-B24D-4026-1CCE-9E4222B674B1}"/>
+              </a:ext>
+            </a:extLst>
+          </p:cNvPr>
+          <p:cNvSpPr>
+            <a:spLocks noGrp="1"/>
+          </p:cNvSpPr>
+          <p:nvPr>
+            <p:ph type="dt" sz="half" idx="2"/>
+          </p:nvPr>
+        </p:nvSpPr>
+        <p:spPr>
+          <a:xfrm>
+            <a:off x="2522091" y="6461798"/>
+            <a:ext cx="686365" cy="180000"/>
+          </a:xfrm>
+        </p:spPr>
+        <p:txBody>
+          <a:bodyPr/>
+          <a:lstStyle/>
+          <a:p>
+            <a:r>
+              <a:rPr lang="de-DE">
+                <a:solidFill>
+                  <a:srgbClr val="000000"/>
+                </a:solidFill>
+              </a:rPr>
+              <a:t>10.12.2024</a:t>
+            </a:r>
+            <a:endParaRPr lang="de-DE" dirty="0">
+              <a:solidFill>
+                <a:srgbClr val="000000"/>
+              </a:solidFill>
+            </a:endParaRPr>
+          </a:p>
+        </p:txBody>
+      </p:sp>
+      <p:sp>
+        <p:nvSpPr>
+          <p:cNvPr id="14" name="Fußzeilenplatzhalter 13">
+            <a:extLst>
+              <a:ext uri="{FF2B5EF4-FFF2-40B4-BE49-F238E27FC236}">
+                <a16:creationId xmlns:a16="http://schemas.microsoft.com/office/drawing/2014/main" id="{F24AEC7F-8DBF-57AD-0F91-7D23D2032C53}"/>
+              </a:ext>
+            </a:extLst>
+          </p:cNvPr>
+          <p:cNvSpPr>
+            <a:spLocks noGrp="1"/>
+          </p:cNvSpPr>
+          <p:nvPr>
+            <p:ph type="ftr" sz="quarter" idx="3"/>
+          </p:nvPr>
+        </p:nvSpPr>
+        <p:spPr>
+          <a:xfrm>
+            <a:off x="3298662" y="6463629"/>
+            <a:ext cx="6480000" cy="180000"/>
+          </a:xfrm>
+        </p:spPr>
+        <p:txBody>
+          <a:bodyPr/>
+          <a:lstStyle/>
+          <a:p>
+            <a:r>
+              <a:rPr lang="de-DE">
+                <a:solidFill>
+                  <a:srgbClr val="000000"/>
+                </a:solidFill>
+              </a:rPr>
+              <a:t>"Easy ISiK" - Track Fortgeschrittene mit Fokus Dokumentenaustausch</a:t>
+            </a:r>
+            <a:endParaRPr lang="de-DE" dirty="0">
+              <a:solidFill>
+                <a:srgbClr val="000000"/>
+              </a:solidFill>
+            </a:endParaRPr>
+          </a:p>
+        </p:txBody>
+      </p:sp>
+      <p:sp>
+        <p:nvSpPr>
+          <p:cNvPr id="2" name="Foliennummernplatzhalter 1">
+            <a:extLst>
+              <a:ext uri="{FF2B5EF4-FFF2-40B4-BE49-F238E27FC236}">
+                <a16:creationId xmlns:a16="http://schemas.microsoft.com/office/drawing/2014/main" id="{846A3D82-06F7-F029-DCE3-E989FE9438AF}"/>
+              </a:ext>
+            </a:extLst>
+          </p:cNvPr>
+          <p:cNvSpPr>
+            <a:spLocks noGrp="1"/>
+          </p:cNvSpPr>
+          <p:nvPr>
+            <p:ph type="sldNum" sz="quarter" idx="4"/>
+          </p:nvPr>
+        </p:nvSpPr>
+        <p:spPr>
+          <a:xfrm>
+            <a:off x="10956550" y="6493730"/>
+            <a:ext cx="686174" cy="180000"/>
+          </a:xfrm>
+        </p:spPr>
+        <p:txBody>
+          <a:bodyPr/>
+          <a:lstStyle/>
+          <a:p>
+            <a:fld id="{4E94CFA2-DDEE-4F46-AAD3-48DE685EA116}" type="slidenum">
+              <a:rPr lang="de-DE" smtClean="0"/>
+              <a:pPr/>
+              <a:t>11</a:t>
+            </a:fld>
+            <a:endParaRPr lang="de-DE" dirty="0"/>
+          </a:p>
+        </p:txBody>
+      </p:sp>
+      <p:pic>
+        <p:nvPicPr>
+          <p:cNvPr id="6" name="Grafik 5">
+            <a:extLst>
+              <a:ext uri="{FF2B5EF4-FFF2-40B4-BE49-F238E27FC236}">
+                <a16:creationId xmlns:a16="http://schemas.microsoft.com/office/drawing/2014/main" id="{5BFCAF6A-9FD8-1364-01F0-FAE79CDE13A7}"/>
+              </a:ext>
+            </a:extLst>
+          </p:cNvPr>
+          <p:cNvPicPr>
+            <a:picLocks noChangeAspect="1"/>
+          </p:cNvPicPr>
+          <p:nvPr/>
+        </p:nvPicPr>
+        <p:blipFill>
+          <a:blip r:embed="rId2"/>
+          <a:stretch>
+            <a:fillRect/>
+          </a:stretch>
+        </p:blipFill>
+        <p:spPr>
+          <a:xfrm>
+            <a:off x="542924" y="1207589"/>
+            <a:ext cx="10291908" cy="4652825"/>
+          </a:xfrm>
+          <a:prstGeom prst="rect">
+            <a:avLst/>
+          </a:prstGeom>
+        </p:spPr>
+      </p:pic>
+    </p:spTree>
+    <p:extLst>
+      <p:ext uri="{BB962C8B-B14F-4D97-AF65-F5344CB8AC3E}">
+        <p14:creationId xmlns:p14="http://schemas.microsoft.com/office/powerpoint/2010/main" val="2090994985"/>
+      </p:ext>
+    </p:extLst>
+  </p:cSld>
+  <p:clrMapOvr>
+    <a:masterClrMapping/>
+  </p:clrMapOvr>
+</p:sld>
+</file>
+
+<file path=ppt/slides/slide12.xml><?xml version="1.0" encoding="utf-8"?>
+<p:sld xmlns:a="http://schemas.openxmlformats.org/drawingml/2006/main" xmlns:r="http://schemas.openxmlformats.org/officeDocument/2006/relationships" xmlns:p="http://schemas.openxmlformats.org/presentationml/2006/main">
+  <p:cSld>
+    <p:spTree>
+      <p:nvGrpSpPr>
+        <p:cNvPr id="1" name=""/>
+        <p:cNvGrpSpPr/>
+        <p:nvPr/>
+      </p:nvGrpSpPr>
+      <p:grpSpPr>
+        <a:xfrm>
+          <a:off x="0" y="0"/>
+          <a:ext cx="0" cy="0"/>
+          <a:chOff x="0" y="0"/>
+          <a:chExt cx="0" cy="0"/>
+        </a:xfrm>
+      </p:grpSpPr>
+      <p:sp>
+        <p:nvSpPr>
+          <p:cNvPr id="2" name="Titel 1">
+            <a:extLst>
+              <a:ext uri="{FF2B5EF4-FFF2-40B4-BE49-F238E27FC236}">
+                <a16:creationId xmlns:a16="http://schemas.microsoft.com/office/drawing/2014/main" id="{3FA5BBD7-AC34-B9BE-D224-9B3CF512BF38}"/>
+              </a:ext>
+            </a:extLst>
+          </p:cNvPr>
+          <p:cNvSpPr>
+            <a:spLocks noGrp="1"/>
+          </p:cNvSpPr>
+          <p:nvPr>
+            <p:ph type="title"/>
+          </p:nvPr>
+        </p:nvSpPr>
+        <p:spPr/>
+        <p:txBody>
+          <a:bodyPr/>
+          <a:lstStyle/>
+          <a:p>
+            <a:r>
+              <a:rPr lang="de-DE" dirty="0" err="1"/>
+              <a:t>ISiK</a:t>
+            </a:r>
+            <a:r>
+              <a:rPr lang="de-DE" dirty="0"/>
+              <a:t> </a:t>
+            </a:r>
+            <a:r>
+              <a:rPr lang="de-DE" dirty="0" err="1"/>
+              <a:t>Connectathon</a:t>
+            </a:r>
+            <a:r>
+              <a:rPr lang="de-DE" dirty="0"/>
+              <a:t> - Übersicht Ansprechpartner</a:t>
+            </a:r>
+          </a:p>
+        </p:txBody>
+      </p:sp>
+      <p:sp>
+        <p:nvSpPr>
+          <p:cNvPr id="3" name="Textplatzhalter 2">
+            <a:extLst>
+              <a:ext uri="{FF2B5EF4-FFF2-40B4-BE49-F238E27FC236}">
+                <a16:creationId xmlns:a16="http://schemas.microsoft.com/office/drawing/2014/main" id="{9BF376DD-06C5-0521-371A-90C251B90F70}"/>
+              </a:ext>
+            </a:extLst>
+          </p:cNvPr>
+          <p:cNvSpPr>
+            <a:spLocks noGrp="1"/>
+          </p:cNvSpPr>
+          <p:nvPr>
+            <p:ph type="body" sz="quarter" idx="10"/>
+          </p:nvPr>
+        </p:nvSpPr>
+        <p:spPr/>
+        <p:txBody>
+          <a:bodyPr/>
+          <a:lstStyle/>
+          <a:p>
+            <a:pPr marL="0" indent="0">
+              <a:buNone/>
+            </a:pPr>
+            <a:r>
+              <a:rPr lang="de-DE" dirty="0"/>
+              <a:t>Bereitgestellt Systeme</a:t>
+            </a:r>
+          </a:p>
+          <a:p>
+            <a:r>
+              <a:rPr lang="de-DE" dirty="0"/>
+              <a:t>ISIK Mock-Server: Patrick Werner</a:t>
+            </a:r>
+          </a:p>
+          <a:p>
+            <a:r>
+              <a:rPr lang="de-DE" dirty="0" err="1"/>
+              <a:t>ISiK</a:t>
+            </a:r>
+            <a:r>
+              <a:rPr lang="de-DE" dirty="0"/>
+              <a:t> Dokumenten-Server: Nils Benning (</a:t>
+            </a:r>
+            <a:r>
+              <a:rPr lang="de-DE" dirty="0" err="1"/>
+              <a:t>d.velop</a:t>
+            </a:r>
+            <a:r>
+              <a:rPr lang="de-DE" dirty="0"/>
+              <a:t>)</a:t>
+            </a:r>
+          </a:p>
+          <a:p>
+            <a:r>
+              <a:rPr lang="de-DE" dirty="0" err="1"/>
+              <a:t>ISiK</a:t>
+            </a:r>
+            <a:r>
+              <a:rPr lang="de-DE" dirty="0"/>
+              <a:t> Terminplanungs-Client: </a:t>
+            </a:r>
+            <a:r>
+              <a:rPr lang="de-DE" dirty="0" err="1"/>
+              <a:t>doctolib</a:t>
+            </a:r>
+            <a:r>
+              <a:rPr lang="de-DE" dirty="0"/>
+              <a:t> ?</a:t>
+            </a:r>
+          </a:p>
+          <a:p>
+            <a:r>
+              <a:rPr lang="de-DE" dirty="0"/>
+              <a:t>Weitere?</a:t>
+            </a:r>
+          </a:p>
+          <a:p>
+            <a:pPr marL="0" indent="0">
+              <a:buNone/>
+            </a:pPr>
+            <a:endParaRPr lang="de-DE" dirty="0"/>
+          </a:p>
+          <a:p>
+            <a:pPr marL="0" indent="0">
+              <a:buNone/>
+            </a:pPr>
+            <a:r>
+              <a:rPr lang="de-DE" dirty="0"/>
+              <a:t>Organisatorisches und weiteres</a:t>
+            </a:r>
+          </a:p>
+          <a:p>
+            <a:r>
+              <a:rPr lang="de-DE" dirty="0"/>
+              <a:t>Ansgar Höper</a:t>
+            </a:r>
+          </a:p>
+          <a:p>
+            <a:r>
+              <a:rPr lang="de-DE" dirty="0"/>
+              <a:t>Francois Peverali</a:t>
+            </a:r>
+          </a:p>
+          <a:p>
+            <a:endParaRPr lang="de-DE" dirty="0"/>
+          </a:p>
+          <a:p>
+            <a:endParaRPr lang="de-DE" dirty="0"/>
+          </a:p>
+          <a:p>
+            <a:endParaRPr lang="de-DE" dirty="0"/>
+          </a:p>
+        </p:txBody>
+      </p:sp>
+      <p:sp>
+        <p:nvSpPr>
+          <p:cNvPr id="4" name="Datumsplatzhalter 3">
+            <a:extLst>
+              <a:ext uri="{FF2B5EF4-FFF2-40B4-BE49-F238E27FC236}">
+                <a16:creationId xmlns:a16="http://schemas.microsoft.com/office/drawing/2014/main" id="{9235E5CC-9617-F9B1-E0B6-DACC9EC49613}"/>
+              </a:ext>
+            </a:extLst>
+          </p:cNvPr>
+          <p:cNvSpPr>
+            <a:spLocks noGrp="1"/>
+          </p:cNvSpPr>
+          <p:nvPr>
+            <p:ph type="dt" sz="half" idx="2"/>
+          </p:nvPr>
+        </p:nvSpPr>
+        <p:spPr/>
+        <p:txBody>
+          <a:bodyPr/>
+          <a:lstStyle/>
+          <a:p>
+            <a:r>
+              <a:rPr lang="de-DE"/>
+              <a:t>10.12.2024</a:t>
+            </a:r>
+            <a:endParaRPr lang="de-DE" dirty="0"/>
+          </a:p>
+        </p:txBody>
+      </p:sp>
+      <p:sp>
+        <p:nvSpPr>
+          <p:cNvPr id="5" name="Fußzeilenplatzhalter 4">
+            <a:extLst>
+              <a:ext uri="{FF2B5EF4-FFF2-40B4-BE49-F238E27FC236}">
+                <a16:creationId xmlns:a16="http://schemas.microsoft.com/office/drawing/2014/main" id="{6E658307-A626-27D2-8F26-2C4DE3E7D889}"/>
+              </a:ext>
+            </a:extLst>
+          </p:cNvPr>
+          <p:cNvSpPr>
+            <a:spLocks noGrp="1"/>
+          </p:cNvSpPr>
+          <p:nvPr>
+            <p:ph type="ftr" sz="quarter" idx="3"/>
+          </p:nvPr>
+        </p:nvSpPr>
+        <p:spPr/>
+        <p:txBody>
+          <a:bodyPr/>
+          <a:lstStyle/>
+          <a:p>
+            <a:r>
+              <a:rPr lang="de-DE"/>
+              <a:t>"Easy ISiK" - Track Fortgeschrittene mit Fokus Dokumentenaustausch</a:t>
+            </a:r>
+            <a:endParaRPr lang="de-DE" dirty="0"/>
+          </a:p>
+        </p:txBody>
+      </p:sp>
+      <p:sp>
+        <p:nvSpPr>
+          <p:cNvPr id="6" name="Foliennummernplatzhalter 5">
+            <a:extLst>
+              <a:ext uri="{FF2B5EF4-FFF2-40B4-BE49-F238E27FC236}">
+                <a16:creationId xmlns:a16="http://schemas.microsoft.com/office/drawing/2014/main" id="{E6D5315A-448D-7F8D-AA00-E7349667ED01}"/>
+              </a:ext>
+            </a:extLst>
+          </p:cNvPr>
+          <p:cNvSpPr>
+            <a:spLocks noGrp="1"/>
+          </p:cNvSpPr>
+          <p:nvPr>
+            <p:ph type="sldNum" sz="quarter" idx="4"/>
+          </p:nvPr>
+        </p:nvSpPr>
+        <p:spPr/>
+        <p:txBody>
+          <a:bodyPr/>
+          <a:lstStyle/>
+          <a:p>
+            <a:fld id="{4E94CFA2-DDEE-4F46-AAD3-48DE685EA116}" type="slidenum">
+              <a:rPr lang="de-DE" smtClean="0"/>
+              <a:pPr/>
+              <a:t>12</a:t>
+            </a:fld>
+            <a:endParaRPr lang="de-DE" dirty="0"/>
+          </a:p>
+        </p:txBody>
+      </p:sp>
+    </p:spTree>
+    <p:extLst>
+      <p:ext uri="{BB962C8B-B14F-4D97-AF65-F5344CB8AC3E}">
+        <p14:creationId xmlns:p14="http://schemas.microsoft.com/office/powerpoint/2010/main" val="2899996491"/>
+      </p:ext>
+    </p:extLst>
+  </p:cSld>
+  <p:clrMapOvr>
+    <a:masterClrMapping/>
+  </p:clrMapOvr>
+</p:sld>
+</file>
+
+<file path=ppt/slides/slide13.xml><?xml version="1.0" encoding="utf-8"?>
+<p:sld xmlns:a="http://schemas.openxmlformats.org/drawingml/2006/main" xmlns:r="http://schemas.openxmlformats.org/officeDocument/2006/relationships" xmlns:p="http://schemas.openxmlformats.org/presentationml/2006/main">
+  <p:cSld>
+    <p:spTree>
+      <p:nvGrpSpPr>
+        <p:cNvPr id="1" name="">
+          <a:extLst>
+            <a:ext uri="{FF2B5EF4-FFF2-40B4-BE49-F238E27FC236}">
+              <a16:creationId xmlns:a16="http://schemas.microsoft.com/office/drawing/2014/main" id="{FE72BE7F-A52C-41D9-25A2-45C32A956D96}"/>
+            </a:ext>
+          </a:extLst>
+        </p:cNvPr>
+        <p:cNvGrpSpPr/>
+        <p:nvPr/>
+      </p:nvGrpSpPr>
+      <p:grpSpPr>
+        <a:xfrm>
+          <a:off x="0" y="0"/>
+          <a:ext cx="0" cy="0"/>
+          <a:chOff x="0" y="0"/>
+          <a:chExt cx="0" cy="0"/>
+        </a:xfrm>
+      </p:grpSpPr>
+      <p:sp>
+        <p:nvSpPr>
+          <p:cNvPr id="5" name="Titel 4">
+            <a:extLst>
+              <a:ext uri="{FF2B5EF4-FFF2-40B4-BE49-F238E27FC236}">
+                <a16:creationId xmlns:a16="http://schemas.microsoft.com/office/drawing/2014/main" id="{464F699C-DBF9-46AE-4DB8-331147906787}"/>
+              </a:ext>
+            </a:extLst>
+          </p:cNvPr>
+          <p:cNvSpPr>
+            <a:spLocks noGrp="1"/>
+          </p:cNvSpPr>
+          <p:nvPr>
+            <p:ph type="title"/>
+          </p:nvPr>
+        </p:nvSpPr>
+        <p:spPr/>
+        <p:txBody>
+          <a:bodyPr/>
+          <a:lstStyle/>
+          <a:p>
+            <a:r>
+              <a:rPr lang="de-DE" dirty="0"/>
+              <a:t>Fazit – </a:t>
+            </a:r>
+            <a:r>
+              <a:rPr lang="de-DE" dirty="0" err="1"/>
+              <a:t>ISiK</a:t>
+            </a:r>
+            <a:r>
+              <a:rPr lang="de-DE" dirty="0"/>
+              <a:t> </a:t>
+            </a:r>
+            <a:r>
+              <a:rPr lang="de-DE" dirty="0" err="1"/>
+              <a:t>Connectathon</a:t>
+            </a:r>
+            <a:endParaRPr lang="de-DE" dirty="0"/>
+          </a:p>
+        </p:txBody>
+      </p:sp>
+      <p:sp>
+        <p:nvSpPr>
+          <p:cNvPr id="3" name="Textplatzhalter 2">
+            <a:extLst>
+              <a:ext uri="{FF2B5EF4-FFF2-40B4-BE49-F238E27FC236}">
+                <a16:creationId xmlns:a16="http://schemas.microsoft.com/office/drawing/2014/main" id="{070AF782-0E35-1276-56C0-8634FECD0F20}"/>
+              </a:ext>
+            </a:extLst>
+          </p:cNvPr>
+          <p:cNvSpPr>
+            <a:spLocks noGrp="1"/>
+          </p:cNvSpPr>
+          <p:nvPr>
+            <p:ph type="body" sz="quarter" idx="10"/>
+          </p:nvPr>
+        </p:nvSpPr>
+        <p:spPr>
+          <a:xfrm>
+            <a:off x="553317" y="1860551"/>
+            <a:ext cx="8384945" cy="3365500"/>
+          </a:xfrm>
+        </p:spPr>
+        <p:txBody>
+          <a:bodyPr/>
+          <a:lstStyle/>
+          <a:p>
+            <a:r>
+              <a:rPr lang="de-DE" dirty="0"/>
+              <a:t>Was wir erreicht haben</a:t>
+            </a:r>
+          </a:p>
+          <a:p>
+            <a:r>
+              <a:rPr lang="de-DE" dirty="0"/>
+              <a:t>Was wir gelernt haben</a:t>
+            </a:r>
+          </a:p>
+          <a:p>
+            <a:r>
+              <a:rPr lang="de-DE" dirty="0"/>
+              <a:t>Was können wir noch nicht?</a:t>
+            </a:r>
+          </a:p>
+          <a:p>
+            <a:endParaRPr lang="de-DE" dirty="0"/>
+          </a:p>
+          <a:p>
+            <a:endParaRPr lang="de-DE" dirty="0"/>
+          </a:p>
+        </p:txBody>
+      </p:sp>
+      <p:sp>
+        <p:nvSpPr>
+          <p:cNvPr id="13" name="Datumsplatzhalter 12">
+            <a:extLst>
+              <a:ext uri="{FF2B5EF4-FFF2-40B4-BE49-F238E27FC236}">
+                <a16:creationId xmlns:a16="http://schemas.microsoft.com/office/drawing/2014/main" id="{43A9F52A-B322-483C-022F-9D527EAB0C1A}"/>
+              </a:ext>
+            </a:extLst>
+          </p:cNvPr>
+          <p:cNvSpPr>
+            <a:spLocks noGrp="1"/>
+          </p:cNvSpPr>
+          <p:nvPr>
+            <p:ph type="dt" sz="half" idx="2"/>
+          </p:nvPr>
+        </p:nvSpPr>
+        <p:spPr>
+          <a:xfrm>
+            <a:off x="2522091" y="6461798"/>
+            <a:ext cx="686365" cy="180000"/>
+          </a:xfrm>
+        </p:spPr>
+        <p:txBody>
+          <a:bodyPr/>
+          <a:lstStyle/>
+          <a:p>
+            <a:r>
+              <a:rPr lang="de-DE">
+                <a:solidFill>
+                  <a:srgbClr val="000000"/>
+                </a:solidFill>
+              </a:rPr>
+              <a:t>10.12.2024</a:t>
+            </a:r>
+            <a:endParaRPr lang="de-DE" dirty="0">
+              <a:solidFill>
+                <a:srgbClr val="000000"/>
+              </a:solidFill>
+            </a:endParaRPr>
+          </a:p>
+        </p:txBody>
+      </p:sp>
+      <p:sp>
+        <p:nvSpPr>
+          <p:cNvPr id="14" name="Fußzeilenplatzhalter 13">
+            <a:extLst>
+              <a:ext uri="{FF2B5EF4-FFF2-40B4-BE49-F238E27FC236}">
+                <a16:creationId xmlns:a16="http://schemas.microsoft.com/office/drawing/2014/main" id="{E650C4B4-DF63-BEAE-BEDC-392ABBA00B80}"/>
+              </a:ext>
+            </a:extLst>
+          </p:cNvPr>
+          <p:cNvSpPr>
+            <a:spLocks noGrp="1"/>
+          </p:cNvSpPr>
+          <p:nvPr>
+            <p:ph type="ftr" sz="quarter" idx="3"/>
+          </p:nvPr>
+        </p:nvSpPr>
+        <p:spPr>
+          <a:xfrm>
+            <a:off x="3298662" y="6463629"/>
+            <a:ext cx="6480000" cy="180000"/>
+          </a:xfrm>
+        </p:spPr>
+        <p:txBody>
+          <a:bodyPr/>
+          <a:lstStyle/>
+          <a:p>
+            <a:r>
+              <a:rPr lang="de-DE">
+                <a:solidFill>
+                  <a:srgbClr val="000000"/>
+                </a:solidFill>
+              </a:rPr>
+              <a:t>"Easy ISiK" - Track Fortgeschrittene mit Fokus Dokumentenaustausch</a:t>
+            </a:r>
+            <a:endParaRPr lang="de-DE" dirty="0">
+              <a:solidFill>
+                <a:srgbClr val="000000"/>
+              </a:solidFill>
+            </a:endParaRPr>
+          </a:p>
+        </p:txBody>
+      </p:sp>
+      <p:sp>
+        <p:nvSpPr>
+          <p:cNvPr id="2" name="Foliennummernplatzhalter 1">
+            <a:extLst>
+              <a:ext uri="{FF2B5EF4-FFF2-40B4-BE49-F238E27FC236}">
+                <a16:creationId xmlns:a16="http://schemas.microsoft.com/office/drawing/2014/main" id="{1701C184-DD04-7183-DCDF-E7EA5236062F}"/>
+              </a:ext>
+            </a:extLst>
+          </p:cNvPr>
+          <p:cNvSpPr>
+            <a:spLocks noGrp="1"/>
+          </p:cNvSpPr>
+          <p:nvPr>
+            <p:ph type="sldNum" sz="quarter" idx="4"/>
+          </p:nvPr>
+        </p:nvSpPr>
+        <p:spPr>
+          <a:xfrm>
+            <a:off x="10956550" y="6493730"/>
+            <a:ext cx="686174" cy="180000"/>
+          </a:xfrm>
+        </p:spPr>
+        <p:txBody>
+          <a:bodyPr/>
+          <a:lstStyle/>
+          <a:p>
+            <a:fld id="{4E94CFA2-DDEE-4F46-AAD3-48DE685EA116}" type="slidenum">
+              <a:rPr lang="de-DE" smtClean="0"/>
+              <a:pPr/>
+              <a:t>13</a:t>
+            </a:fld>
+            <a:endParaRPr lang="de-DE" dirty="0"/>
+          </a:p>
+        </p:txBody>
+      </p:sp>
+    </p:spTree>
+    <p:extLst>
+      <p:ext uri="{BB962C8B-B14F-4D97-AF65-F5344CB8AC3E}">
+        <p14:creationId xmlns:p14="http://schemas.microsoft.com/office/powerpoint/2010/main" val="1265481475"/>
+      </p:ext>
+    </p:extLst>
+  </p:cSld>
+  <p:clrMapOvr>
+    <a:masterClrMapping/>
+  </p:clrMapOvr>
+</p:sld>
+</file>
+
+<file path=ppt/slides/slide14.xml><?xml version="1.0" encoding="utf-8"?>
+<p:sld xmlns:a="http://schemas.openxmlformats.org/drawingml/2006/main" xmlns:r="http://schemas.openxmlformats.org/officeDocument/2006/relationships" xmlns:p="http://schemas.openxmlformats.org/presentationml/2006/main">
+  <p:cSld>
+    <p:spTree>
+      <p:nvGrpSpPr>
+        <p:cNvPr id="1" name=""/>
+        <p:cNvGrpSpPr/>
+        <p:nvPr/>
+      </p:nvGrpSpPr>
+      <p:grpSpPr>
+        <a:xfrm>
+          <a:off x="0" y="0"/>
+          <a:ext cx="0" cy="0"/>
+          <a:chOff x="0" y="0"/>
+          <a:chExt cx="0" cy="0"/>
+        </a:xfrm>
+      </p:grpSpPr>
+      <p:sp>
+        <p:nvSpPr>
+          <p:cNvPr id="2" name="Titel 1">
+            <a:extLst>
+              <a:ext uri="{FF2B5EF4-FFF2-40B4-BE49-F238E27FC236}">
+                <a16:creationId xmlns:a16="http://schemas.microsoft.com/office/drawing/2014/main" id="{5B054580-D7BE-7C41-8721-D228C9A5D013}"/>
+              </a:ext>
+            </a:extLst>
+          </p:cNvPr>
+          <p:cNvSpPr>
+            <a:spLocks noGrp="1"/>
+          </p:cNvSpPr>
+          <p:nvPr>
+            <p:ph type="title"/>
+          </p:nvPr>
+        </p:nvSpPr>
+        <p:spPr/>
+        <p:txBody>
+          <a:bodyPr/>
+          <a:lstStyle/>
+          <a:p>
+            <a:r>
+              <a:rPr lang="de-DE" dirty="0" err="1"/>
+              <a:t>gematik</a:t>
+            </a:r>
+            <a:r>
+              <a:rPr lang="de-DE" dirty="0"/>
+              <a:t>.</a:t>
+            </a:r>
+            <a:br>
+              <a:rPr lang="de-DE" b="0" dirty="0"/>
+            </a:br>
+            <a:r>
+              <a:rPr lang="de-DE" dirty="0"/>
+              <a:t>Gesunde Aussichten.</a:t>
+            </a:r>
+            <a:endParaRPr lang="de-DE" b="0" dirty="0"/>
+          </a:p>
+        </p:txBody>
+      </p:sp>
+      <p:sp>
+        <p:nvSpPr>
+          <p:cNvPr id="5" name="Datumsplatzhalter 4">
+            <a:extLst>
+              <a:ext uri="{FF2B5EF4-FFF2-40B4-BE49-F238E27FC236}">
+                <a16:creationId xmlns:a16="http://schemas.microsoft.com/office/drawing/2014/main" id="{96EDE2D6-A878-A943-B86E-D5974A4EFA13}"/>
+              </a:ext>
+            </a:extLst>
+          </p:cNvPr>
+          <p:cNvSpPr>
+            <a:spLocks noGrp="1"/>
+          </p:cNvSpPr>
+          <p:nvPr>
+            <p:ph type="dt" sz="half" idx="10"/>
+          </p:nvPr>
+        </p:nvSpPr>
+        <p:spPr/>
+        <p:txBody>
+          <a:bodyPr/>
+          <a:lstStyle/>
+          <a:p>
+            <a:r>
+              <a:rPr lang="de-DE"/>
+              <a:t>10.12.2024</a:t>
+            </a:r>
+            <a:endParaRPr lang="de-DE" dirty="0"/>
+          </a:p>
+        </p:txBody>
+      </p:sp>
+      <p:sp>
+        <p:nvSpPr>
+          <p:cNvPr id="3" name="Fußzeilenplatzhalter 2">
+            <a:extLst>
+              <a:ext uri="{FF2B5EF4-FFF2-40B4-BE49-F238E27FC236}">
+                <a16:creationId xmlns:a16="http://schemas.microsoft.com/office/drawing/2014/main" id="{036AFD21-19BB-5644-85A6-38962CB47FC4}"/>
+              </a:ext>
+            </a:extLst>
+          </p:cNvPr>
+          <p:cNvSpPr>
+            <a:spLocks noGrp="1"/>
+          </p:cNvSpPr>
+          <p:nvPr>
+            <p:ph type="ftr" sz="quarter" idx="11"/>
+          </p:nvPr>
+        </p:nvSpPr>
+        <p:spPr/>
+        <p:txBody>
+          <a:bodyPr/>
+          <a:lstStyle/>
+          <a:p>
+            <a:r>
+              <a:rPr lang="de-DE"/>
+              <a:t>"Easy ISiK" - Track Fortgeschrittene mit Fokus Dokumentenaustausch</a:t>
+            </a:r>
+            <a:endParaRPr lang="de-DE" dirty="0"/>
+          </a:p>
+        </p:txBody>
+      </p:sp>
+      <p:sp>
+        <p:nvSpPr>
+          <p:cNvPr id="6" name="Textplatzhalter 5">
+            <a:extLst>
+              <a:ext uri="{FF2B5EF4-FFF2-40B4-BE49-F238E27FC236}">
+                <a16:creationId xmlns:a16="http://schemas.microsoft.com/office/drawing/2014/main" id="{FD314ECE-AA79-8741-A87F-4238A32DD079}"/>
+              </a:ext>
+            </a:extLst>
+          </p:cNvPr>
+          <p:cNvSpPr>
+            <a:spLocks noGrp="1"/>
+          </p:cNvSpPr>
+          <p:nvPr>
+            <p:ph type="body" sz="quarter" idx="14"/>
+          </p:nvPr>
+        </p:nvSpPr>
+        <p:spPr/>
+        <p:txBody>
+          <a:bodyPr/>
+          <a:lstStyle/>
+          <a:p>
+            <a:r>
+              <a:rPr lang="de-DE" dirty="0"/>
+              <a:t>Team Data – </a:t>
+            </a:r>
+            <a:r>
+              <a:rPr lang="de-DE" dirty="0" err="1"/>
+              <a:t>ISiK</a:t>
+            </a:r>
+            <a:endParaRPr lang="de-DE" dirty="0"/>
+          </a:p>
+          <a:p>
+            <a:endParaRPr lang="de-DE" dirty="0"/>
+          </a:p>
+        </p:txBody>
+      </p:sp>
+      <p:sp>
+        <p:nvSpPr>
+          <p:cNvPr id="7" name="Textplatzhalter 6">
+            <a:extLst>
+              <a:ext uri="{FF2B5EF4-FFF2-40B4-BE49-F238E27FC236}">
+                <a16:creationId xmlns:a16="http://schemas.microsoft.com/office/drawing/2014/main" id="{B86DDB65-BCC3-8745-8EC6-47D4E048C438}"/>
+              </a:ext>
+            </a:extLst>
+          </p:cNvPr>
+          <p:cNvSpPr>
+            <a:spLocks noGrp="1"/>
+          </p:cNvSpPr>
+          <p:nvPr>
+            <p:ph type="body" sz="quarter" idx="15"/>
+          </p:nvPr>
+        </p:nvSpPr>
+        <p:spPr>
+          <a:xfrm>
+            <a:off x="554038" y="4969565"/>
+            <a:ext cx="7185524" cy="1053548"/>
+          </a:xfrm>
+        </p:spPr>
+        <p:txBody>
+          <a:bodyPr/>
+          <a:lstStyle/>
+          <a:p>
+            <a:r>
+              <a:rPr lang="de-DE" dirty="0"/>
+              <a:t>Weitere Anfragen bitte an :</a:t>
+            </a:r>
+          </a:p>
+          <a:p>
+            <a:r>
+              <a:rPr lang="de-DE" dirty="0"/>
+              <a:t>https://service.gematik.de/servicedesk/customer/portal/16 </a:t>
+            </a:r>
+          </a:p>
+          <a:p>
+            <a:endParaRPr lang="de-DE" dirty="0"/>
+          </a:p>
+          <a:p>
+            <a:endParaRPr lang="de-DE" dirty="0"/>
+          </a:p>
+        </p:txBody>
+      </p:sp>
+      <p:sp>
+        <p:nvSpPr>
+          <p:cNvPr id="4" name="Foliennummernplatzhalter 3"/>
+          <p:cNvSpPr>
+            <a:spLocks noGrp="1"/>
+          </p:cNvSpPr>
+          <p:nvPr>
+            <p:ph type="sldNum" sz="quarter" idx="12"/>
+          </p:nvPr>
+        </p:nvSpPr>
+        <p:spPr/>
+        <p:txBody>
+          <a:bodyPr/>
+          <a:lstStyle/>
+          <a:p>
+            <a:fld id="{4E94CFA2-DDEE-4F46-AAD3-48DE685EA116}" type="slidenum">
+              <a:rPr lang="de-DE" smtClean="0"/>
+              <a:pPr/>
+              <a:t>14</a:t>
             </a:fld>
             <a:endParaRPr lang="de-DE" dirty="0"/>
           </a:p>
@@ -28021,14 +28990,51 @@
           <a:bodyPr/>
           <a:lstStyle/>
           <a:p>
-            <a:fld id="{CFE4FC9E-5DAC-42D0-A944-738ADB42186D}" type="datetime1">
-              <a:rPr lang="de-DE" smtClean="0">
+            <a:r>
+              <a:rPr lang="de-DE" dirty="0">
                 <a:solidFill>
                   <a:srgbClr val="000000"/>
                 </a:solidFill>
               </a:rPr>
-              <a:t>03.12.2024</a:t>
-            </a:fld>
+              <a:t>10.12.2024</a:t>
+            </a:r>
+          </a:p>
+        </p:txBody>
+      </p:sp>
+      <p:sp>
+        <p:nvSpPr>
+          <p:cNvPr id="4" name="Fußzeilenplatzhalter 3">
+            <a:extLst>
+              <a:ext uri="{FF2B5EF4-FFF2-40B4-BE49-F238E27FC236}">
+                <a16:creationId xmlns:a16="http://schemas.microsoft.com/office/drawing/2014/main" id="{D87492FA-72CD-E24E-8A3F-0AD762832B69}"/>
+              </a:ext>
+            </a:extLst>
+          </p:cNvPr>
+          <p:cNvSpPr>
+            <a:spLocks noGrp="1"/>
+          </p:cNvSpPr>
+          <p:nvPr>
+            <p:ph type="ftr" sz="quarter" idx="3"/>
+          </p:nvPr>
+        </p:nvSpPr>
+        <p:spPr>
+          <a:xfrm>
+            <a:off x="3298662" y="6463629"/>
+            <a:ext cx="6480000" cy="180000"/>
+          </a:xfrm>
+        </p:spPr>
+        <p:txBody>
+          <a:bodyPr/>
+          <a:lstStyle/>
+          <a:p>
+            <a:r>
+              <a:rPr lang="de-DE">
+                <a:solidFill>
+                  <a:srgbClr val="000000"/>
+                </a:solidFill>
+              </a:rPr>
+              <a:t>"Easy ISiK" - Track Fortgeschrittene mit Fokus Dokumentenaustausch</a:t>
+            </a:r>
             <a:endParaRPr lang="de-DE" dirty="0">
               <a:solidFill>
                 <a:srgbClr val="000000"/>
@@ -28039,48 +29045,6 @@
       </p:sp>
       <p:sp>
         <p:nvSpPr>
-          <p:cNvPr id="4" name="Fußzeilenplatzhalter 3">
-            <a:extLst>
-              <a:ext uri="{FF2B5EF4-FFF2-40B4-BE49-F238E27FC236}">
-                <a16:creationId xmlns:a16="http://schemas.microsoft.com/office/drawing/2014/main" id="{D87492FA-72CD-E24E-8A3F-0AD762832B69}"/>
-              </a:ext>
-            </a:extLst>
-          </p:cNvPr>
-          <p:cNvSpPr>
-            <a:spLocks noGrp="1"/>
-          </p:cNvSpPr>
-          <p:nvPr>
-            <p:ph type="ftr" sz="quarter" idx="3"/>
-          </p:nvPr>
-        </p:nvSpPr>
-        <p:spPr>
-          <a:xfrm>
-            <a:off x="3298662" y="6463629"/>
-            <a:ext cx="6480000" cy="180000"/>
-          </a:xfrm>
-        </p:spPr>
-        <p:txBody>
-          <a:bodyPr/>
-          <a:lstStyle/>
-          <a:p>
-            <a:r>
-              <a:rPr lang="de-DE">
-                <a:solidFill>
-                  <a:srgbClr val="000000"/>
-                </a:solidFill>
-              </a:rPr>
-              <a:t>ISiK und Krankenhaus Stakeholder</a:t>
-            </a:r>
-            <a:endParaRPr lang="de-DE" dirty="0">
-              <a:solidFill>
-                <a:srgbClr val="000000"/>
-              </a:solidFill>
-            </a:endParaRPr>
-          </a:p>
-        </p:txBody>
-      </p:sp>
-      <p:sp>
-        <p:nvSpPr>
           <p:cNvPr id="9" name="Textplatzhalter 8">
             <a:extLst>
               <a:ext uri="{FF2B5EF4-FFF2-40B4-BE49-F238E27FC236}">
@@ -28115,8 +29079,12 @@
               <a:buChar char="•"/>
             </a:pPr>
             <a:r>
-              <a:rPr lang="de-DE" dirty="0"/>
-              <a:t>Connect - 9.30 Uhr </a:t>
+              <a:rPr lang="de-DE" dirty="0" err="1"/>
+              <a:t>Connectathon</a:t>
+            </a:r>
+            <a:r>
+              <a:rPr lang="de-DE" dirty="0"/>
+              <a:t> - 9.30 Uhr </a:t>
             </a:r>
           </a:p>
           <a:p>
@@ -28143,6 +29111,13 @@
             <a:r>
               <a:rPr lang="de-DE" dirty="0"/>
               <a:t> „Mock-Server“ – u.a. dafür Postman-Collection als „Skelett“ vorbereitet</a:t>
+            </a:r>
+          </a:p>
+          <a:p>
+            <a:pPr marL="552150" lvl="1" indent="-285750"/>
+            <a:r>
+              <a:rPr lang="de-DE" dirty="0"/>
+              <a:t>Weitere?</a:t>
             </a:r>
           </a:p>
           <a:p>
@@ -28162,7 +29137,7 @@
             </a:pPr>
             <a:r>
               <a:rPr lang="de-DE" dirty="0"/>
-              <a:t>Weitermachen!</a:t>
+              <a:t>… es geht weiter</a:t>
             </a:r>
           </a:p>
           <a:p>
@@ -28573,14 +29548,14 @@
           <a:bodyPr/>
           <a:lstStyle/>
           <a:p>
-            <a:fld id="{0E224B17-6BAA-419A-A10E-EF501F5A3EF3}" type="datetime1">
-              <a:rPr lang="de-DE" smtClean="0">
+            <a:r>
+              <a:rPr lang="de-DE">
                 <a:solidFill>
                   <a:srgbClr val="000000"/>
                 </a:solidFill>
               </a:rPr>
-              <a:t>03.12.2024</a:t>
-            </a:fld>
+              <a:t>10.12.2024</a:t>
+            </a:r>
             <a:endParaRPr lang="de-DE" dirty="0">
               <a:solidFill>
                 <a:srgbClr val="000000"/>
@@ -28621,7 +29596,7 @@
                   <a:srgbClr val="000000"/>
                 </a:solidFill>
               </a:rPr>
-              <a:t>ISiK und Krankenhaus Stakeholder</a:t>
+              <a:t>"Easy ISiK" - Track Fortgeschrittene mit Fokus Dokumentenaustausch</a:t>
             </a:r>
             <a:endParaRPr lang="de-DE" dirty="0">
               <a:solidFill>
@@ -28680,6 +29655,299 @@
 </file>
 
 <file path=ppt/slides/slide4.xml><?xml version="1.0" encoding="utf-8"?>
+<p:sld xmlns:a="http://schemas.openxmlformats.org/drawingml/2006/main" xmlns:r="http://schemas.openxmlformats.org/officeDocument/2006/relationships" xmlns:p="http://schemas.openxmlformats.org/presentationml/2006/main">
+  <p:cSld>
+    <p:spTree>
+      <p:nvGrpSpPr>
+        <p:cNvPr id="1" name="">
+          <a:extLst>
+            <a:ext uri="{FF2B5EF4-FFF2-40B4-BE49-F238E27FC236}">
+              <a16:creationId xmlns:a16="http://schemas.microsoft.com/office/drawing/2014/main" id="{4BB17E9E-BF89-D052-FE6A-27B242DFA31A}"/>
+            </a:ext>
+          </a:extLst>
+        </p:cNvPr>
+        <p:cNvGrpSpPr/>
+        <p:nvPr/>
+      </p:nvGrpSpPr>
+      <p:grpSpPr>
+        <a:xfrm>
+          <a:off x="0" y="0"/>
+          <a:ext cx="0" cy="0"/>
+          <a:chOff x="0" y="0"/>
+          <a:chExt cx="0" cy="0"/>
+        </a:xfrm>
+      </p:grpSpPr>
+      <p:sp>
+        <p:nvSpPr>
+          <p:cNvPr id="5" name="Titel 4">
+            <a:extLst>
+              <a:ext uri="{FF2B5EF4-FFF2-40B4-BE49-F238E27FC236}">
+                <a16:creationId xmlns:a16="http://schemas.microsoft.com/office/drawing/2014/main" id="{28E84D6E-46F5-487A-7B1D-6ECC15DED0FE}"/>
+              </a:ext>
+            </a:extLst>
+          </p:cNvPr>
+          <p:cNvSpPr>
+            <a:spLocks noGrp="1"/>
+          </p:cNvSpPr>
+          <p:nvPr>
+            <p:ph type="title"/>
+          </p:nvPr>
+        </p:nvSpPr>
+        <p:spPr/>
+        <p:txBody>
+          <a:bodyPr/>
+          <a:lstStyle/>
+          <a:p>
+            <a:r>
+              <a:rPr lang="de-DE" dirty="0"/>
+              <a:t>Szenarien – Weitere?</a:t>
+            </a:r>
+          </a:p>
+        </p:txBody>
+      </p:sp>
+      <p:sp>
+        <p:nvSpPr>
+          <p:cNvPr id="3" name="Textplatzhalter 2">
+            <a:extLst>
+              <a:ext uri="{FF2B5EF4-FFF2-40B4-BE49-F238E27FC236}">
+                <a16:creationId xmlns:a16="http://schemas.microsoft.com/office/drawing/2014/main" id="{96CA43E8-CAE0-4E51-D999-7AC89EC0BB5B}"/>
+              </a:ext>
+            </a:extLst>
+          </p:cNvPr>
+          <p:cNvSpPr>
+            <a:spLocks noGrp="1"/>
+          </p:cNvSpPr>
+          <p:nvPr>
+            <p:ph type="body" sz="quarter" idx="10"/>
+          </p:nvPr>
+        </p:nvSpPr>
+        <p:spPr>
+          <a:xfrm>
+            <a:off x="542924" y="1851252"/>
+            <a:ext cx="8384945" cy="3365500"/>
+          </a:xfrm>
+        </p:spPr>
+        <p:txBody>
+          <a:bodyPr/>
+          <a:lstStyle/>
+          <a:p>
+            <a:pPr lvl="1"/>
+            <a:r>
+              <a:rPr lang="de-DE" dirty="0"/>
+              <a:t>Weitere Szenarien entlang der Spezifikation?</a:t>
+            </a:r>
+          </a:p>
+          <a:p>
+            <a:pPr lvl="2"/>
+            <a:r>
+              <a:rPr lang="de-DE" dirty="0">
+                <a:solidFill>
+                  <a:srgbClr val="333333"/>
+                </a:solidFill>
+                <a:latin typeface="Open Sans" panose="020B0606030504020204" pitchFamily="34" charset="0"/>
+              </a:rPr>
+              <a:t>Terminplanung – hier </a:t>
+            </a:r>
+            <a:r>
+              <a:rPr lang="de-DE" dirty="0" err="1">
+                <a:solidFill>
+                  <a:srgbClr val="333333"/>
+                </a:solidFill>
+                <a:latin typeface="Open Sans" panose="020B0606030504020204" pitchFamily="34" charset="0"/>
+              </a:rPr>
+              <a:t>doctolib</a:t>
+            </a:r>
+            <a:r>
+              <a:rPr lang="de-DE" dirty="0">
+                <a:solidFill>
+                  <a:srgbClr val="333333"/>
+                </a:solidFill>
+                <a:latin typeface="Open Sans" panose="020B0606030504020204" pitchFamily="34" charset="0"/>
+              </a:rPr>
+              <a:t> als Client</a:t>
+            </a:r>
+            <a:endParaRPr lang="de-DE" dirty="0"/>
+          </a:p>
+          <a:p>
+            <a:pPr lvl="2"/>
+            <a:r>
+              <a:rPr lang="de-DE" b="0" i="0" dirty="0">
+                <a:solidFill>
+                  <a:srgbClr val="333333"/>
+                </a:solidFill>
+                <a:effectLst/>
+                <a:latin typeface="Open Sans" panose="020B0606030504020204" pitchFamily="34" charset="0"/>
+              </a:rPr>
+              <a:t>Wenn ja, welche (Module)?</a:t>
+            </a:r>
+          </a:p>
+          <a:p>
+            <a:pPr lvl="1"/>
+            <a:endParaRPr lang="de-DE" b="0" i="0" dirty="0">
+              <a:solidFill>
+                <a:srgbClr val="333333"/>
+              </a:solidFill>
+              <a:effectLst/>
+              <a:latin typeface="Open Sans" panose="020B0606030504020204" pitchFamily="34" charset="0"/>
+            </a:endParaRPr>
+          </a:p>
+          <a:p>
+            <a:pPr lvl="1"/>
+            <a:endParaRPr lang="de-DE" dirty="0"/>
+          </a:p>
+          <a:p>
+            <a:pPr lvl="1"/>
+            <a:endParaRPr lang="de-DE" dirty="0"/>
+          </a:p>
+          <a:p>
+            <a:pPr lvl="2"/>
+            <a:endParaRPr lang="de-DE" dirty="0"/>
+          </a:p>
+          <a:p>
+            <a:pPr lvl="1"/>
+            <a:endParaRPr lang="de-DE" dirty="0"/>
+          </a:p>
+          <a:p>
+            <a:endParaRPr lang="de-DE" dirty="0"/>
+          </a:p>
+          <a:p>
+            <a:endParaRPr lang="de-DE" dirty="0"/>
+          </a:p>
+        </p:txBody>
+      </p:sp>
+      <p:sp>
+        <p:nvSpPr>
+          <p:cNvPr id="13" name="Datumsplatzhalter 12">
+            <a:extLst>
+              <a:ext uri="{FF2B5EF4-FFF2-40B4-BE49-F238E27FC236}">
+                <a16:creationId xmlns:a16="http://schemas.microsoft.com/office/drawing/2014/main" id="{06287812-35B0-BDBD-FE17-69B44AE14B54}"/>
+              </a:ext>
+            </a:extLst>
+          </p:cNvPr>
+          <p:cNvSpPr>
+            <a:spLocks noGrp="1"/>
+          </p:cNvSpPr>
+          <p:nvPr>
+            <p:ph type="dt" sz="half" idx="2"/>
+          </p:nvPr>
+        </p:nvSpPr>
+        <p:spPr>
+          <a:xfrm>
+            <a:off x="2522091" y="6461798"/>
+            <a:ext cx="686365" cy="180000"/>
+          </a:xfrm>
+        </p:spPr>
+        <p:txBody>
+          <a:bodyPr/>
+          <a:lstStyle/>
+          <a:p>
+            <a:r>
+              <a:rPr lang="de-DE">
+                <a:solidFill>
+                  <a:srgbClr val="000000"/>
+                </a:solidFill>
+              </a:rPr>
+              <a:t>10.12.2024</a:t>
+            </a:r>
+            <a:endParaRPr lang="de-DE" dirty="0">
+              <a:solidFill>
+                <a:srgbClr val="000000"/>
+              </a:solidFill>
+            </a:endParaRPr>
+          </a:p>
+        </p:txBody>
+      </p:sp>
+      <p:sp>
+        <p:nvSpPr>
+          <p:cNvPr id="14" name="Fußzeilenplatzhalter 13">
+            <a:extLst>
+              <a:ext uri="{FF2B5EF4-FFF2-40B4-BE49-F238E27FC236}">
+                <a16:creationId xmlns:a16="http://schemas.microsoft.com/office/drawing/2014/main" id="{4F0EAF43-6CE5-6AB7-9CFD-8BC8AECC186F}"/>
+              </a:ext>
+            </a:extLst>
+          </p:cNvPr>
+          <p:cNvSpPr>
+            <a:spLocks noGrp="1"/>
+          </p:cNvSpPr>
+          <p:nvPr>
+            <p:ph type="ftr" sz="quarter" idx="3"/>
+          </p:nvPr>
+        </p:nvSpPr>
+        <p:spPr>
+          <a:xfrm>
+            <a:off x="3298662" y="6463629"/>
+            <a:ext cx="6480000" cy="180000"/>
+          </a:xfrm>
+        </p:spPr>
+        <p:txBody>
+          <a:bodyPr/>
+          <a:lstStyle/>
+          <a:p>
+            <a:r>
+              <a:rPr lang="de-DE">
+                <a:solidFill>
+                  <a:srgbClr val="000000"/>
+                </a:solidFill>
+              </a:rPr>
+              <a:t>"Easy ISiK" - Track Fortgeschrittene mit Fokus Dokumentenaustausch</a:t>
+            </a:r>
+            <a:endParaRPr lang="de-DE" dirty="0">
+              <a:solidFill>
+                <a:srgbClr val="000000"/>
+              </a:solidFill>
+            </a:endParaRPr>
+          </a:p>
+        </p:txBody>
+      </p:sp>
+      <p:sp>
+        <p:nvSpPr>
+          <p:cNvPr id="2" name="Foliennummernplatzhalter 1">
+            <a:extLst>
+              <a:ext uri="{FF2B5EF4-FFF2-40B4-BE49-F238E27FC236}">
+                <a16:creationId xmlns:a16="http://schemas.microsoft.com/office/drawing/2014/main" id="{35125C49-F45C-8DAC-B93F-B95656269D1A}"/>
+              </a:ext>
+            </a:extLst>
+          </p:cNvPr>
+          <p:cNvSpPr>
+            <a:spLocks noGrp="1"/>
+          </p:cNvSpPr>
+          <p:nvPr>
+            <p:ph type="sldNum" sz="quarter" idx="4"/>
+          </p:nvPr>
+        </p:nvSpPr>
+        <p:spPr>
+          <a:xfrm>
+            <a:off x="10956550" y="6493730"/>
+            <a:ext cx="686174" cy="180000"/>
+          </a:xfrm>
+        </p:spPr>
+        <p:txBody>
+          <a:bodyPr/>
+          <a:lstStyle/>
+          <a:p>
+            <a:fld id="{4E94CFA2-DDEE-4F46-AAD3-48DE685EA116}" type="slidenum">
+              <a:rPr lang="de-DE" smtClean="0"/>
+              <a:pPr/>
+              <a:t>4</a:t>
+            </a:fld>
+            <a:endParaRPr lang="de-DE" dirty="0"/>
+          </a:p>
+        </p:txBody>
+      </p:sp>
+    </p:spTree>
+    <p:extLst>
+      <p:ext uri="{BB962C8B-B14F-4D97-AF65-F5344CB8AC3E}">
+        <p14:creationId xmlns:p14="http://schemas.microsoft.com/office/powerpoint/2010/main" val="3572634504"/>
+      </p:ext>
+    </p:extLst>
+  </p:cSld>
+  <p:clrMapOvr>
+    <a:masterClrMapping/>
+  </p:clrMapOvr>
+</p:sld>
+</file>
+
+<file path=ppt/slides/slide5.xml><?xml version="1.0" encoding="utf-8"?>
 <p:sld xmlns:a="http://schemas.openxmlformats.org/drawingml/2006/main" xmlns:r="http://schemas.openxmlformats.org/officeDocument/2006/relationships" xmlns:p="http://schemas.openxmlformats.org/presentationml/2006/main">
   <p:cSld>
     <p:spTree>
@@ -28724,8 +29992,12 @@
           <a:lstStyle/>
           <a:p>
             <a:r>
-              <a:rPr lang="de-DE" dirty="0"/>
-              <a:t>Connect – Dokumenten-Server</a:t>
+              <a:rPr lang="de-DE" dirty="0" err="1"/>
+              <a:t>Connectathon</a:t>
+            </a:r>
+            <a:r>
+              <a:rPr lang="de-DE" dirty="0"/>
+              <a:t> – Dokumenten-Server</a:t>
             </a:r>
           </a:p>
         </p:txBody>
@@ -28768,7 +30040,7 @@
             <a:pPr lvl="1"/>
             <a:r>
               <a:rPr lang="de-DE" dirty="0"/>
-              <a:t>Wer ist Ansprechpartner bei </a:t>
+              <a:t>Ansprechpartner: Nils Benning (</a:t>
             </a:r>
             <a:r>
               <a:rPr lang="de-DE" dirty="0" err="1"/>
@@ -28776,7 +30048,7 @@
             </a:r>
             <a:r>
               <a:rPr lang="de-DE" dirty="0"/>
-              <a:t>?</a:t>
+              <a:t>)</a:t>
             </a:r>
           </a:p>
           <a:p>
@@ -28787,12 +30059,31 @@
             </a:r>
             <a:r>
               <a:rPr lang="de-DE" dirty="0">
-                <a:solidFill>
-                  <a:schemeClr val="accent2"/>
-                </a:solidFill>
+                <a:hlinkClick r:id="rId2"/>
               </a:rPr>
-              <a:t>???</a:t>
-            </a:r>
+              <a:t>https://on-bengal-badly.ngrok-free.app/fhir</a:t>
+            </a:r>
+            <a:endParaRPr lang="de-DE" dirty="0"/>
+          </a:p>
+          <a:p>
+            <a:pPr lvl="2"/>
+            <a:r>
+              <a:rPr lang="en-US" dirty="0"/>
+              <a:t>Basic Auth User: </a:t>
+            </a:r>
+            <a:r>
+              <a:rPr lang="en-US" dirty="0" err="1"/>
+              <a:t>dvelop</a:t>
+            </a:r>
+            <a:endParaRPr lang="en-US" dirty="0"/>
+          </a:p>
+          <a:p>
+            <a:pPr lvl="2"/>
+            <a:r>
+              <a:rPr lang="en-US" dirty="0"/>
+              <a:t>Basic Auth Password: FTCD2024</a:t>
+            </a:r>
+            <a:endParaRPr lang="de-DE" dirty="0"/>
           </a:p>
           <a:p>
             <a:pPr lvl="1"/>
@@ -28843,14 +30134,14 @@
           <a:bodyPr/>
           <a:lstStyle/>
           <a:p>
-            <a:fld id="{0E224B17-6BAA-419A-A10E-EF501F5A3EF3}" type="datetime1">
-              <a:rPr lang="de-DE" smtClean="0">
+            <a:r>
+              <a:rPr lang="de-DE">
                 <a:solidFill>
                   <a:srgbClr val="000000"/>
                 </a:solidFill>
               </a:rPr>
-              <a:t>03.12.2024</a:t>
-            </a:fld>
+              <a:t>10.12.2024</a:t>
+            </a:r>
             <a:endParaRPr lang="de-DE" dirty="0">
               <a:solidFill>
                 <a:srgbClr val="000000"/>
@@ -28891,7 +30182,7 @@
                   <a:srgbClr val="000000"/>
                 </a:solidFill>
               </a:rPr>
-              <a:t>ISiK und Krankenhaus Stakeholder</a:t>
+              <a:t>"Easy ISiK" - Track Fortgeschrittene mit Fokus Dokumentenaustausch</a:t>
             </a:r>
             <a:endParaRPr lang="de-DE" dirty="0">
               <a:solidFill>
@@ -28930,7 +30221,7 @@
             <a:fld id="{4E94CFA2-DDEE-4F46-AAD3-48DE685EA116}" type="slidenum">
               <a:rPr lang="de-DE" smtClean="0"/>
               <a:pPr/>
-              <a:t>4</a:t>
+              <a:t>5</a:t>
             </a:fld>
             <a:endParaRPr lang="de-DE" dirty="0"/>
           </a:p>
@@ -28949,7 +30240,7 @@
 </p:sld>
 </file>
 
-<file path=ppt/slides/slide5.xml><?xml version="1.0" encoding="utf-8"?>
+<file path=ppt/slides/slide6.xml><?xml version="1.0" encoding="utf-8"?>
 <p:sld xmlns:a="http://schemas.openxmlformats.org/drawingml/2006/main" xmlns:r="http://schemas.openxmlformats.org/officeDocument/2006/relationships" xmlns:p="http://schemas.openxmlformats.org/presentationml/2006/main">
   <p:cSld>
     <p:spTree>
@@ -28994,8 +30285,12 @@
           <a:lstStyle/>
           <a:p>
             <a:r>
-              <a:rPr lang="de-DE" dirty="0"/>
-              <a:t>Connect – </a:t>
+              <a:rPr lang="de-DE" dirty="0" err="1"/>
+              <a:t>Connectathon</a:t>
+            </a:r>
+            <a:r>
+              <a:rPr lang="de-DE" dirty="0"/>
+              <a:t> – </a:t>
             </a:r>
             <a:r>
               <a:rPr lang="de-DE" dirty="0" err="1"/>
@@ -29033,6 +30328,29 @@
         <p:txBody>
           <a:bodyPr/>
           <a:lstStyle/>
+          <a:p>
+            <a:pPr marL="0" lvl="1" indent="0">
+              <a:buNone/>
+            </a:pPr>
+            <a:r>
+              <a:rPr lang="de-DE" dirty="0"/>
+              <a:t>Ein Mockup-Server mit Packages entsprechend der </a:t>
+            </a:r>
+            <a:r>
+              <a:rPr lang="de-DE" dirty="0" err="1"/>
+              <a:t>ISiK</a:t>
+            </a:r>
+            <a:r>
+              <a:rPr lang="de-DE" dirty="0"/>
+              <a:t> Stufe 3</a:t>
+            </a:r>
+          </a:p>
+          <a:p>
+            <a:pPr marL="0" lvl="1" indent="0">
+              <a:buNone/>
+            </a:pPr>
+            <a:endParaRPr lang="de-DE" dirty="0"/>
+          </a:p>
           <a:p>
             <a:pPr marL="0" lvl="1" indent="0">
               <a:buNone/>
@@ -29118,14 +30436,14 @@
           <a:bodyPr/>
           <a:lstStyle/>
           <a:p>
-            <a:fld id="{0E224B17-6BAA-419A-A10E-EF501F5A3EF3}" type="datetime1">
-              <a:rPr lang="de-DE" smtClean="0">
+            <a:r>
+              <a:rPr lang="de-DE">
                 <a:solidFill>
                   <a:srgbClr val="000000"/>
                 </a:solidFill>
               </a:rPr>
-              <a:t>03.12.2024</a:t>
-            </a:fld>
+              <a:t>10.12.2024</a:t>
+            </a:r>
             <a:endParaRPr lang="de-DE" dirty="0">
               <a:solidFill>
                 <a:srgbClr val="000000"/>
@@ -29166,7 +30484,7 @@
                   <a:srgbClr val="000000"/>
                 </a:solidFill>
               </a:rPr>
-              <a:t>ISiK und Krankenhaus Stakeholder</a:t>
+              <a:t>"Easy ISiK" - Track Fortgeschrittene mit Fokus Dokumentenaustausch</a:t>
             </a:r>
             <a:endParaRPr lang="de-DE" dirty="0">
               <a:solidFill>
@@ -29205,7 +30523,7 @@
             <a:fld id="{4E94CFA2-DDEE-4F46-AAD3-48DE685EA116}" type="slidenum">
               <a:rPr lang="de-DE" smtClean="0"/>
               <a:pPr/>
-              <a:t>5</a:t>
+              <a:t>6</a:t>
             </a:fld>
             <a:endParaRPr lang="de-DE" dirty="0"/>
           </a:p>
@@ -29224,7 +30542,608 @@
 </p:sld>
 </file>
 
-<file path=ppt/slides/slide6.xml><?xml version="1.0" encoding="utf-8"?>
+<file path=ppt/slides/slide7.xml><?xml version="1.0" encoding="utf-8"?>
+<p:sld xmlns:a="http://schemas.openxmlformats.org/drawingml/2006/main" xmlns:r="http://schemas.openxmlformats.org/officeDocument/2006/relationships" xmlns:p="http://schemas.openxmlformats.org/presentationml/2006/main">
+  <p:cSld>
+    <p:spTree>
+      <p:nvGrpSpPr>
+        <p:cNvPr id="1" name="">
+          <a:extLst>
+            <a:ext uri="{FF2B5EF4-FFF2-40B4-BE49-F238E27FC236}">
+              <a16:creationId xmlns:a16="http://schemas.microsoft.com/office/drawing/2014/main" id="{308E5550-D1C6-DE3E-282B-9B947BAB8194}"/>
+            </a:ext>
+          </a:extLst>
+        </p:cNvPr>
+        <p:cNvGrpSpPr/>
+        <p:nvPr/>
+      </p:nvGrpSpPr>
+      <p:grpSpPr>
+        <a:xfrm>
+          <a:off x="0" y="0"/>
+          <a:ext cx="0" cy="0"/>
+          <a:chOff x="0" y="0"/>
+          <a:chExt cx="0" cy="0"/>
+        </a:xfrm>
+      </p:grpSpPr>
+      <p:sp>
+        <p:nvSpPr>
+          <p:cNvPr id="5" name="Titel 4">
+            <a:extLst>
+              <a:ext uri="{FF2B5EF4-FFF2-40B4-BE49-F238E27FC236}">
+                <a16:creationId xmlns:a16="http://schemas.microsoft.com/office/drawing/2014/main" id="{24920478-14CB-6D32-94E3-381D65CF88F2}"/>
+              </a:ext>
+            </a:extLst>
+          </p:cNvPr>
+          <p:cNvSpPr>
+            <a:spLocks noGrp="1"/>
+          </p:cNvSpPr>
+          <p:nvPr>
+            <p:ph type="title"/>
+          </p:nvPr>
+        </p:nvSpPr>
+        <p:spPr/>
+        <p:txBody>
+          <a:bodyPr/>
+          <a:lstStyle/>
+          <a:p>
+            <a:r>
+              <a:rPr lang="de-DE" dirty="0" err="1"/>
+              <a:t>Connectathon</a:t>
+            </a:r>
+            <a:r>
+              <a:rPr lang="de-DE" dirty="0"/>
+              <a:t> – </a:t>
+            </a:r>
+            <a:r>
+              <a:rPr lang="de-DE" dirty="0" err="1"/>
+              <a:t>doctolib</a:t>
+            </a:r>
+            <a:r>
+              <a:rPr lang="de-DE" dirty="0"/>
+              <a:t> als Client für </a:t>
+            </a:r>
+            <a:r>
+              <a:rPr lang="de-DE" dirty="0" err="1"/>
+              <a:t>ISiK</a:t>
+            </a:r>
+            <a:r>
+              <a:rPr lang="de-DE" dirty="0"/>
+              <a:t> Terminplanung</a:t>
+            </a:r>
+          </a:p>
+        </p:txBody>
+      </p:sp>
+      <p:sp>
+        <p:nvSpPr>
+          <p:cNvPr id="3" name="Textplatzhalter 2">
+            <a:extLst>
+              <a:ext uri="{FF2B5EF4-FFF2-40B4-BE49-F238E27FC236}">
+                <a16:creationId xmlns:a16="http://schemas.microsoft.com/office/drawing/2014/main" id="{FB948DD9-6A83-F338-C8A0-899E5A3FA25E}"/>
+              </a:ext>
+            </a:extLst>
+          </p:cNvPr>
+          <p:cNvSpPr>
+            <a:spLocks noGrp="1"/>
+          </p:cNvSpPr>
+          <p:nvPr>
+            <p:ph type="body" sz="quarter" idx="10"/>
+          </p:nvPr>
+        </p:nvSpPr>
+        <p:spPr>
+          <a:xfrm>
+            <a:off x="542924" y="1851252"/>
+            <a:ext cx="8384945" cy="3365500"/>
+          </a:xfrm>
+        </p:spPr>
+        <p:txBody>
+          <a:bodyPr/>
+          <a:lstStyle/>
+          <a:p>
+            <a:pPr marL="0" lvl="1" indent="0">
+              <a:buNone/>
+            </a:pPr>
+            <a:r>
+              <a:rPr lang="de-DE" dirty="0"/>
+              <a:t>Möchten weitere Hersteller ihre Endpunkte freigeben?</a:t>
+            </a:r>
+          </a:p>
+          <a:p>
+            <a:pPr lvl="1"/>
+            <a:r>
+              <a:rPr lang="de-DE" dirty="0"/>
+              <a:t>Ansprechpartner: ?</a:t>
+            </a:r>
+          </a:p>
+          <a:p>
+            <a:pPr lvl="1"/>
+            <a:r>
+              <a:rPr lang="de-DE" dirty="0"/>
+              <a:t>Hier ein Server jenseits von </a:t>
+            </a:r>
+            <a:r>
+              <a:rPr lang="de-DE" dirty="0" err="1"/>
+              <a:t>ISiK</a:t>
+            </a:r>
+            <a:r>
+              <a:rPr lang="de-DE" dirty="0"/>
+              <a:t>-</a:t>
+            </a:r>
+            <a:r>
+              <a:rPr lang="de-DE" dirty="0" err="1"/>
+              <a:t>Moc</a:t>
+            </a:r>
+            <a:r>
+              <a:rPr lang="de-DE" dirty="0"/>
+              <a:t>-Server verfügbar?</a:t>
+            </a:r>
+          </a:p>
+          <a:p>
+            <a:pPr lvl="1"/>
+            <a:r>
+              <a:rPr lang="de-DE" dirty="0">
+                <a:solidFill>
+                  <a:schemeClr val="accent2"/>
+                </a:solidFill>
+              </a:rPr>
+              <a:t>Weitere Infos?</a:t>
+            </a:r>
+          </a:p>
+          <a:p>
+            <a:pPr marL="0" lvl="1" indent="0">
+              <a:buNone/>
+            </a:pPr>
+            <a:endParaRPr lang="de-DE" dirty="0"/>
+          </a:p>
+          <a:p>
+            <a:pPr lvl="1"/>
+            <a:endParaRPr lang="de-DE" dirty="0"/>
+          </a:p>
+          <a:p>
+            <a:endParaRPr lang="de-DE" dirty="0"/>
+          </a:p>
+          <a:p>
+            <a:endParaRPr lang="de-DE" dirty="0"/>
+          </a:p>
+        </p:txBody>
+      </p:sp>
+      <p:sp>
+        <p:nvSpPr>
+          <p:cNvPr id="13" name="Datumsplatzhalter 12">
+            <a:extLst>
+              <a:ext uri="{FF2B5EF4-FFF2-40B4-BE49-F238E27FC236}">
+                <a16:creationId xmlns:a16="http://schemas.microsoft.com/office/drawing/2014/main" id="{4D5D3679-06CC-61E4-BB96-7A03CDBA570B}"/>
+              </a:ext>
+            </a:extLst>
+          </p:cNvPr>
+          <p:cNvSpPr>
+            <a:spLocks noGrp="1"/>
+          </p:cNvSpPr>
+          <p:nvPr>
+            <p:ph type="dt" sz="half" idx="2"/>
+          </p:nvPr>
+        </p:nvSpPr>
+        <p:spPr>
+          <a:xfrm>
+            <a:off x="2522091" y="6461798"/>
+            <a:ext cx="686365" cy="180000"/>
+          </a:xfrm>
+        </p:spPr>
+        <p:txBody>
+          <a:bodyPr/>
+          <a:lstStyle/>
+          <a:p>
+            <a:r>
+              <a:rPr lang="de-DE">
+                <a:solidFill>
+                  <a:srgbClr val="000000"/>
+                </a:solidFill>
+              </a:rPr>
+              <a:t>10.12.2024</a:t>
+            </a:r>
+            <a:endParaRPr lang="de-DE" dirty="0">
+              <a:solidFill>
+                <a:srgbClr val="000000"/>
+              </a:solidFill>
+            </a:endParaRPr>
+          </a:p>
+        </p:txBody>
+      </p:sp>
+      <p:sp>
+        <p:nvSpPr>
+          <p:cNvPr id="14" name="Fußzeilenplatzhalter 13">
+            <a:extLst>
+              <a:ext uri="{FF2B5EF4-FFF2-40B4-BE49-F238E27FC236}">
+                <a16:creationId xmlns:a16="http://schemas.microsoft.com/office/drawing/2014/main" id="{0CB0B34C-CDFD-B923-FFA5-3F3768428940}"/>
+              </a:ext>
+            </a:extLst>
+          </p:cNvPr>
+          <p:cNvSpPr>
+            <a:spLocks noGrp="1"/>
+          </p:cNvSpPr>
+          <p:nvPr>
+            <p:ph type="ftr" sz="quarter" idx="3"/>
+          </p:nvPr>
+        </p:nvSpPr>
+        <p:spPr>
+          <a:xfrm>
+            <a:off x="3298662" y="6463629"/>
+            <a:ext cx="6480000" cy="180000"/>
+          </a:xfrm>
+        </p:spPr>
+        <p:txBody>
+          <a:bodyPr/>
+          <a:lstStyle/>
+          <a:p>
+            <a:r>
+              <a:rPr lang="de-DE">
+                <a:solidFill>
+                  <a:srgbClr val="000000"/>
+                </a:solidFill>
+              </a:rPr>
+              <a:t>"Easy ISiK" - Track Fortgeschrittene mit Fokus Dokumentenaustausch</a:t>
+            </a:r>
+            <a:endParaRPr lang="de-DE" dirty="0">
+              <a:solidFill>
+                <a:srgbClr val="000000"/>
+              </a:solidFill>
+            </a:endParaRPr>
+          </a:p>
+        </p:txBody>
+      </p:sp>
+      <p:sp>
+        <p:nvSpPr>
+          <p:cNvPr id="2" name="Foliennummernplatzhalter 1">
+            <a:extLst>
+              <a:ext uri="{FF2B5EF4-FFF2-40B4-BE49-F238E27FC236}">
+                <a16:creationId xmlns:a16="http://schemas.microsoft.com/office/drawing/2014/main" id="{A28C3548-5012-11B0-FE3B-81533817F7BA}"/>
+              </a:ext>
+            </a:extLst>
+          </p:cNvPr>
+          <p:cNvSpPr>
+            <a:spLocks noGrp="1"/>
+          </p:cNvSpPr>
+          <p:nvPr>
+            <p:ph type="sldNum" sz="quarter" idx="4"/>
+          </p:nvPr>
+        </p:nvSpPr>
+        <p:spPr>
+          <a:xfrm>
+            <a:off x="10956550" y="6493730"/>
+            <a:ext cx="686174" cy="180000"/>
+          </a:xfrm>
+        </p:spPr>
+        <p:txBody>
+          <a:bodyPr/>
+          <a:lstStyle/>
+          <a:p>
+            <a:fld id="{4E94CFA2-DDEE-4F46-AAD3-48DE685EA116}" type="slidenum">
+              <a:rPr lang="de-DE" smtClean="0"/>
+              <a:pPr/>
+              <a:t>7</a:t>
+            </a:fld>
+            <a:endParaRPr lang="de-DE" dirty="0"/>
+          </a:p>
+        </p:txBody>
+      </p:sp>
+    </p:spTree>
+    <p:extLst>
+      <p:ext uri="{BB962C8B-B14F-4D97-AF65-F5344CB8AC3E}">
+        <p14:creationId xmlns:p14="http://schemas.microsoft.com/office/powerpoint/2010/main" val="1849300144"/>
+      </p:ext>
+    </p:extLst>
+  </p:cSld>
+  <p:clrMapOvr>
+    <a:masterClrMapping/>
+  </p:clrMapOvr>
+</p:sld>
+</file>
+
+<file path=ppt/slides/slide8.xml><?xml version="1.0" encoding="utf-8"?>
+<p:sld xmlns:a="http://schemas.openxmlformats.org/drawingml/2006/main" xmlns:r="http://schemas.openxmlformats.org/officeDocument/2006/relationships" xmlns:p="http://schemas.openxmlformats.org/presentationml/2006/main">
+  <p:cSld>
+    <p:spTree>
+      <p:nvGrpSpPr>
+        <p:cNvPr id="1" name="">
+          <a:extLst>
+            <a:ext uri="{FF2B5EF4-FFF2-40B4-BE49-F238E27FC236}">
+              <a16:creationId xmlns:a16="http://schemas.microsoft.com/office/drawing/2014/main" id="{7CEE348C-2811-B812-047E-4DD408D77F5B}"/>
+            </a:ext>
+          </a:extLst>
+        </p:cNvPr>
+        <p:cNvGrpSpPr/>
+        <p:nvPr/>
+      </p:nvGrpSpPr>
+      <p:grpSpPr>
+        <a:xfrm>
+          <a:off x="0" y="0"/>
+          <a:ext cx="0" cy="0"/>
+          <a:chOff x="0" y="0"/>
+          <a:chExt cx="0" cy="0"/>
+        </a:xfrm>
+      </p:grpSpPr>
+      <p:sp>
+        <p:nvSpPr>
+          <p:cNvPr id="5" name="Titel 4">
+            <a:extLst>
+              <a:ext uri="{FF2B5EF4-FFF2-40B4-BE49-F238E27FC236}">
+                <a16:creationId xmlns:a16="http://schemas.microsoft.com/office/drawing/2014/main" id="{F25D2574-58ED-86CA-4828-E8C03267FA14}"/>
+              </a:ext>
+            </a:extLst>
+          </p:cNvPr>
+          <p:cNvSpPr>
+            <a:spLocks noGrp="1"/>
+          </p:cNvSpPr>
+          <p:nvPr>
+            <p:ph type="title"/>
+          </p:nvPr>
+        </p:nvSpPr>
+        <p:spPr/>
+        <p:txBody>
+          <a:bodyPr/>
+          <a:lstStyle/>
+          <a:p>
+            <a:r>
+              <a:rPr lang="de-DE" dirty="0" err="1"/>
+              <a:t>Connectathon</a:t>
+            </a:r>
+            <a:r>
+              <a:rPr lang="de-DE" dirty="0"/>
+              <a:t> – Weitere?</a:t>
+            </a:r>
+          </a:p>
+        </p:txBody>
+      </p:sp>
+      <p:sp>
+        <p:nvSpPr>
+          <p:cNvPr id="3" name="Textplatzhalter 2">
+            <a:extLst>
+              <a:ext uri="{FF2B5EF4-FFF2-40B4-BE49-F238E27FC236}">
+                <a16:creationId xmlns:a16="http://schemas.microsoft.com/office/drawing/2014/main" id="{46927A72-D84D-0923-150D-76F1024F5755}"/>
+              </a:ext>
+            </a:extLst>
+          </p:cNvPr>
+          <p:cNvSpPr>
+            <a:spLocks noGrp="1"/>
+          </p:cNvSpPr>
+          <p:nvPr>
+            <p:ph type="body" sz="quarter" idx="10"/>
+          </p:nvPr>
+        </p:nvSpPr>
+        <p:spPr>
+          <a:xfrm>
+            <a:off x="542924" y="1851252"/>
+            <a:ext cx="8384945" cy="3365500"/>
+          </a:xfrm>
+        </p:spPr>
+        <p:txBody>
+          <a:bodyPr/>
+          <a:lstStyle/>
+          <a:p>
+            <a:pPr marL="0" lvl="1" indent="0">
+              <a:buNone/>
+            </a:pPr>
+            <a:r>
+              <a:rPr lang="de-DE" dirty="0"/>
+              <a:t>Möchten weitere Hersteller ihre Endpunkte freigeben?</a:t>
+            </a:r>
+          </a:p>
+          <a:p>
+            <a:pPr lvl="1"/>
+            <a:r>
+              <a:rPr lang="de-DE" dirty="0"/>
+              <a:t>Ansprechpartner: ?</a:t>
+            </a:r>
+          </a:p>
+          <a:p>
+            <a:pPr lvl="1"/>
+            <a:r>
+              <a:rPr lang="de-DE" dirty="0"/>
+              <a:t>Endpunkt: ?</a:t>
+            </a:r>
+          </a:p>
+          <a:p>
+            <a:pPr lvl="1"/>
+            <a:r>
+              <a:rPr lang="de-DE" dirty="0"/>
+              <a:t>Nils Benning</a:t>
+            </a:r>
+          </a:p>
+          <a:p>
+            <a:pPr lvl="1"/>
+            <a:r>
+              <a:rPr lang="de-DE" dirty="0"/>
+              <a:t>Endpunkt: </a:t>
+            </a:r>
+            <a:r>
+              <a:rPr lang="de-DE" dirty="0">
+                <a:hlinkClick r:id="rId2"/>
+              </a:rPr>
+              <a:t>https://on-bengal-badly.ngrok-free.app/fhir</a:t>
+            </a:r>
+            <a:endParaRPr lang="de-DE" dirty="0"/>
+          </a:p>
+          <a:p>
+            <a:pPr lvl="2"/>
+            <a:r>
+              <a:rPr lang="en-US" dirty="0"/>
+              <a:t>Basic Auth User: </a:t>
+            </a:r>
+            <a:r>
+              <a:rPr lang="en-US" dirty="0" err="1"/>
+              <a:t>dvelop</a:t>
+            </a:r>
+            <a:endParaRPr lang="en-US" dirty="0"/>
+          </a:p>
+          <a:p>
+            <a:pPr lvl="2"/>
+            <a:r>
+              <a:rPr lang="en-US" dirty="0"/>
+              <a:t>Basic Auth Password: FTCD2024</a:t>
+            </a:r>
+            <a:endParaRPr lang="de-DE" dirty="0"/>
+          </a:p>
+          <a:p>
+            <a:pPr lvl="1"/>
+            <a:r>
+              <a:rPr lang="de-DE" dirty="0">
+                <a:solidFill>
+                  <a:schemeClr val="accent2"/>
+                </a:solidFill>
+              </a:rPr>
+              <a:t>Weitere Infos?</a:t>
+            </a:r>
+          </a:p>
+          <a:p>
+            <a:pPr marL="0" lvl="1" indent="0">
+              <a:buNone/>
+            </a:pPr>
+            <a:endParaRPr lang="de-DE" dirty="0"/>
+          </a:p>
+          <a:p>
+            <a:pPr lvl="1"/>
+            <a:endParaRPr lang="de-DE" dirty="0"/>
+          </a:p>
+          <a:p>
+            <a:endParaRPr lang="de-DE" dirty="0"/>
+          </a:p>
+          <a:p>
+            <a:endParaRPr lang="de-DE" dirty="0"/>
+          </a:p>
+        </p:txBody>
+      </p:sp>
+      <p:sp>
+        <p:nvSpPr>
+          <p:cNvPr id="13" name="Datumsplatzhalter 12">
+            <a:extLst>
+              <a:ext uri="{FF2B5EF4-FFF2-40B4-BE49-F238E27FC236}">
+                <a16:creationId xmlns:a16="http://schemas.microsoft.com/office/drawing/2014/main" id="{86EE9808-E799-6801-6E7B-73105C895E43}"/>
+              </a:ext>
+            </a:extLst>
+          </p:cNvPr>
+          <p:cNvSpPr>
+            <a:spLocks noGrp="1"/>
+          </p:cNvSpPr>
+          <p:nvPr>
+            <p:ph type="dt" sz="half" idx="2"/>
+          </p:nvPr>
+        </p:nvSpPr>
+        <p:spPr>
+          <a:xfrm>
+            <a:off x="2522091" y="6461798"/>
+            <a:ext cx="686365" cy="180000"/>
+          </a:xfrm>
+        </p:spPr>
+        <p:txBody>
+          <a:bodyPr/>
+          <a:lstStyle/>
+          <a:p>
+            <a:r>
+              <a:rPr lang="de-DE">
+                <a:solidFill>
+                  <a:srgbClr val="000000"/>
+                </a:solidFill>
+              </a:rPr>
+              <a:t>10.12.2024</a:t>
+            </a:r>
+            <a:endParaRPr lang="de-DE" dirty="0">
+              <a:solidFill>
+                <a:srgbClr val="000000"/>
+              </a:solidFill>
+            </a:endParaRPr>
+          </a:p>
+        </p:txBody>
+      </p:sp>
+      <p:sp>
+        <p:nvSpPr>
+          <p:cNvPr id="14" name="Fußzeilenplatzhalter 13">
+            <a:extLst>
+              <a:ext uri="{FF2B5EF4-FFF2-40B4-BE49-F238E27FC236}">
+                <a16:creationId xmlns:a16="http://schemas.microsoft.com/office/drawing/2014/main" id="{772EA17C-28C6-2E96-6221-CB1CF6E5B197}"/>
+              </a:ext>
+            </a:extLst>
+          </p:cNvPr>
+          <p:cNvSpPr>
+            <a:spLocks noGrp="1"/>
+          </p:cNvSpPr>
+          <p:nvPr>
+            <p:ph type="ftr" sz="quarter" idx="3"/>
+          </p:nvPr>
+        </p:nvSpPr>
+        <p:spPr>
+          <a:xfrm>
+            <a:off x="3298662" y="6463629"/>
+            <a:ext cx="6480000" cy="180000"/>
+          </a:xfrm>
+        </p:spPr>
+        <p:txBody>
+          <a:bodyPr/>
+          <a:lstStyle/>
+          <a:p>
+            <a:r>
+              <a:rPr lang="de-DE">
+                <a:solidFill>
+                  <a:srgbClr val="000000"/>
+                </a:solidFill>
+              </a:rPr>
+              <a:t>"Easy ISiK" - Track Fortgeschrittene mit Fokus Dokumentenaustausch</a:t>
+            </a:r>
+            <a:endParaRPr lang="de-DE" dirty="0">
+              <a:solidFill>
+                <a:srgbClr val="000000"/>
+              </a:solidFill>
+            </a:endParaRPr>
+          </a:p>
+        </p:txBody>
+      </p:sp>
+      <p:sp>
+        <p:nvSpPr>
+          <p:cNvPr id="2" name="Foliennummernplatzhalter 1">
+            <a:extLst>
+              <a:ext uri="{FF2B5EF4-FFF2-40B4-BE49-F238E27FC236}">
+                <a16:creationId xmlns:a16="http://schemas.microsoft.com/office/drawing/2014/main" id="{FAE8A054-42F5-5380-AE81-D08D219E665B}"/>
+              </a:ext>
+            </a:extLst>
+          </p:cNvPr>
+          <p:cNvSpPr>
+            <a:spLocks noGrp="1"/>
+          </p:cNvSpPr>
+          <p:nvPr>
+            <p:ph type="sldNum" sz="quarter" idx="4"/>
+          </p:nvPr>
+        </p:nvSpPr>
+        <p:spPr>
+          <a:xfrm>
+            <a:off x="10956550" y="6493730"/>
+            <a:ext cx="686174" cy="180000"/>
+          </a:xfrm>
+        </p:spPr>
+        <p:txBody>
+          <a:bodyPr/>
+          <a:lstStyle/>
+          <a:p>
+            <a:fld id="{4E94CFA2-DDEE-4F46-AAD3-48DE685EA116}" type="slidenum">
+              <a:rPr lang="de-DE" smtClean="0"/>
+              <a:pPr/>
+              <a:t>8</a:t>
+            </a:fld>
+            <a:endParaRPr lang="de-DE" dirty="0"/>
+          </a:p>
+        </p:txBody>
+      </p:sp>
+    </p:spTree>
+    <p:extLst>
+      <p:ext uri="{BB962C8B-B14F-4D97-AF65-F5344CB8AC3E}">
+        <p14:creationId xmlns:p14="http://schemas.microsoft.com/office/powerpoint/2010/main" val="127363973"/>
+      </p:ext>
+    </p:extLst>
+  </p:cSld>
+  <p:clrMapOvr>
+    <a:masterClrMapping/>
+  </p:clrMapOvr>
+</p:sld>
+</file>
+
+<file path=ppt/slides/slide9.xml><?xml version="1.0" encoding="utf-8"?>
 <p:sld xmlns:a="http://schemas.openxmlformats.org/drawingml/2006/main" xmlns:r="http://schemas.openxmlformats.org/officeDocument/2006/relationships" xmlns:p="http://schemas.openxmlformats.org/presentationml/2006/main">
   <p:cSld>
     <p:spTree>
@@ -29269,8 +31188,12 @@
           <a:lstStyle/>
           <a:p>
             <a:r>
-              <a:rPr lang="de-DE" dirty="0"/>
-              <a:t>Connect – Wie komme ich an den Content?</a:t>
+              <a:rPr lang="de-DE" dirty="0" err="1"/>
+              <a:t>Connectathon</a:t>
+            </a:r>
+            <a:r>
+              <a:rPr lang="de-DE" dirty="0"/>
+              <a:t> – Wie komme ich an den Content?</a:t>
             </a:r>
           </a:p>
         </p:txBody>
@@ -29338,14 +31261,14 @@
           <a:bodyPr/>
           <a:lstStyle/>
           <a:p>
-            <a:fld id="{0E224B17-6BAA-419A-A10E-EF501F5A3EF3}" type="datetime1">
-              <a:rPr lang="de-DE" smtClean="0">
+            <a:r>
+              <a:rPr lang="de-DE">
                 <a:solidFill>
                   <a:srgbClr val="000000"/>
                 </a:solidFill>
               </a:rPr>
-              <a:t>03.12.2024</a:t>
-            </a:fld>
+              <a:t>10.12.2024</a:t>
+            </a:r>
             <a:endParaRPr lang="de-DE" dirty="0">
               <a:solidFill>
                 <a:srgbClr val="000000"/>
@@ -29386,7 +31309,7 @@
                   <a:srgbClr val="000000"/>
                 </a:solidFill>
               </a:rPr>
-              <a:t>ISiK und Krankenhaus Stakeholder</a:t>
+              <a:t>"Easy ISiK" - Track Fortgeschrittene mit Fokus Dokumentenaustausch</a:t>
             </a:r>
             <a:endParaRPr lang="de-DE" dirty="0">
               <a:solidFill>
@@ -29425,7 +31348,7 @@
             <a:fld id="{4E94CFA2-DDEE-4F46-AAD3-48DE685EA116}" type="slidenum">
               <a:rPr lang="de-DE" smtClean="0"/>
               <a:pPr/>
-              <a:t>6</a:t>
+              <a:t>9</a:t>
             </a:fld>
             <a:endParaRPr lang="de-DE" dirty="0"/>
           </a:p>
@@ -29465,677 +31388,6 @@
     <p:extLst>
       <p:ext uri="{BB962C8B-B14F-4D97-AF65-F5344CB8AC3E}">
         <p14:creationId xmlns:p14="http://schemas.microsoft.com/office/powerpoint/2010/main" val="659751322"/>
-      </p:ext>
-    </p:extLst>
-  </p:cSld>
-  <p:clrMapOvr>
-    <a:masterClrMapping/>
-  </p:clrMapOvr>
-</p:sld>
-</file>
-
-<file path=ppt/slides/slide7.xml><?xml version="1.0" encoding="utf-8"?>
-<p:sld xmlns:a="http://schemas.openxmlformats.org/drawingml/2006/main" xmlns:r="http://schemas.openxmlformats.org/officeDocument/2006/relationships" xmlns:p="http://schemas.openxmlformats.org/presentationml/2006/main">
-  <p:cSld>
-    <p:spTree>
-      <p:nvGrpSpPr>
-        <p:cNvPr id="1" name=""/>
-        <p:cNvGrpSpPr/>
-        <p:nvPr/>
-      </p:nvGrpSpPr>
-      <p:grpSpPr>
-        <a:xfrm>
-          <a:off x="0" y="0"/>
-          <a:ext cx="0" cy="0"/>
-          <a:chOff x="0" y="0"/>
-          <a:chExt cx="0" cy="0"/>
-        </a:xfrm>
-      </p:grpSpPr>
-      <p:sp>
-        <p:nvSpPr>
-          <p:cNvPr id="2" name="Titel 1">
-            <a:extLst>
-              <a:ext uri="{FF2B5EF4-FFF2-40B4-BE49-F238E27FC236}">
-                <a16:creationId xmlns:a16="http://schemas.microsoft.com/office/drawing/2014/main" id="{C74B19DF-3D5E-824B-42C2-DEC24B0F6F92}"/>
-              </a:ext>
-            </a:extLst>
-          </p:cNvPr>
-          <p:cNvSpPr>
-            <a:spLocks noGrp="1"/>
-          </p:cNvSpPr>
-          <p:nvPr>
-            <p:ph type="title"/>
-          </p:nvPr>
-        </p:nvSpPr>
-        <p:spPr/>
-        <p:txBody>
-          <a:bodyPr/>
-          <a:lstStyle/>
-          <a:p>
-            <a:r>
-              <a:rPr lang="de-DE" dirty="0"/>
-              <a:t>Connect – Wie komme ich an den Content?</a:t>
-            </a:r>
-          </a:p>
-        </p:txBody>
-      </p:sp>
-      <p:sp>
-        <p:nvSpPr>
-          <p:cNvPr id="3" name="Textplatzhalter 2">
-            <a:extLst>
-              <a:ext uri="{FF2B5EF4-FFF2-40B4-BE49-F238E27FC236}">
-                <a16:creationId xmlns:a16="http://schemas.microsoft.com/office/drawing/2014/main" id="{163DD1D4-2F3A-7326-BCA4-3FCA65393C0B}"/>
-              </a:ext>
-            </a:extLst>
-          </p:cNvPr>
-          <p:cNvSpPr>
-            <a:spLocks noGrp="1"/>
-          </p:cNvSpPr>
-          <p:nvPr>
-            <p:ph type="body" sz="quarter" idx="10"/>
-          </p:nvPr>
-        </p:nvSpPr>
-        <p:spPr/>
-        <p:txBody>
-          <a:bodyPr/>
-          <a:lstStyle/>
-          <a:p>
-            <a:r>
-              <a:rPr lang="de-DE" dirty="0" err="1"/>
-              <a:t>Powerpoint</a:t>
-            </a:r>
-            <a:endParaRPr lang="de-DE" dirty="0"/>
-          </a:p>
-          <a:p>
-            <a:r>
-              <a:rPr lang="de-DE" dirty="0"/>
-              <a:t>Aufgaben</a:t>
-            </a:r>
-          </a:p>
-          <a:p>
-            <a:r>
-              <a:rPr lang="de-DE" dirty="0"/>
-              <a:t>Postman-Collection</a:t>
-            </a:r>
-          </a:p>
-        </p:txBody>
-      </p:sp>
-      <p:sp>
-        <p:nvSpPr>
-          <p:cNvPr id="4" name="Datumsplatzhalter 3">
-            <a:extLst>
-              <a:ext uri="{FF2B5EF4-FFF2-40B4-BE49-F238E27FC236}">
-                <a16:creationId xmlns:a16="http://schemas.microsoft.com/office/drawing/2014/main" id="{9892A8FC-280C-5EB1-BB21-A20DAB295F09}"/>
-              </a:ext>
-            </a:extLst>
-          </p:cNvPr>
-          <p:cNvSpPr>
-            <a:spLocks noGrp="1"/>
-          </p:cNvSpPr>
-          <p:nvPr>
-            <p:ph type="dt" sz="half" idx="2"/>
-          </p:nvPr>
-        </p:nvSpPr>
-        <p:spPr/>
-        <p:txBody>
-          <a:bodyPr/>
-          <a:lstStyle/>
-          <a:p>
-            <a:fld id="{84A273FD-4E80-46A5-957C-33F202EBCB12}" type="datetime1">
-              <a:rPr lang="de-DE" smtClean="0"/>
-              <a:t>03.12.2024</a:t>
-            </a:fld>
-            <a:endParaRPr lang="de-DE" dirty="0"/>
-          </a:p>
-        </p:txBody>
-      </p:sp>
-      <p:sp>
-        <p:nvSpPr>
-          <p:cNvPr id="5" name="Fußzeilenplatzhalter 4">
-            <a:extLst>
-              <a:ext uri="{FF2B5EF4-FFF2-40B4-BE49-F238E27FC236}">
-                <a16:creationId xmlns:a16="http://schemas.microsoft.com/office/drawing/2014/main" id="{8ED58104-E56C-BF4D-48DB-F532992B8501}"/>
-              </a:ext>
-            </a:extLst>
-          </p:cNvPr>
-          <p:cNvSpPr>
-            <a:spLocks noGrp="1"/>
-          </p:cNvSpPr>
-          <p:nvPr>
-            <p:ph type="ftr" sz="quarter" idx="3"/>
-          </p:nvPr>
-        </p:nvSpPr>
-        <p:spPr/>
-        <p:txBody>
-          <a:bodyPr/>
-          <a:lstStyle/>
-          <a:p>
-            <a:r>
-              <a:rPr lang="de-DE"/>
-              <a:t>ISiK und Krankenhaus Stakeholder</a:t>
-            </a:r>
-            <a:endParaRPr lang="de-DE" dirty="0"/>
-          </a:p>
-        </p:txBody>
-      </p:sp>
-      <p:sp>
-        <p:nvSpPr>
-          <p:cNvPr id="6" name="Foliennummernplatzhalter 5">
-            <a:extLst>
-              <a:ext uri="{FF2B5EF4-FFF2-40B4-BE49-F238E27FC236}">
-                <a16:creationId xmlns:a16="http://schemas.microsoft.com/office/drawing/2014/main" id="{D258A4C3-CAA1-9D86-BE28-1DA727070B78}"/>
-              </a:ext>
-            </a:extLst>
-          </p:cNvPr>
-          <p:cNvSpPr>
-            <a:spLocks noGrp="1"/>
-          </p:cNvSpPr>
-          <p:nvPr>
-            <p:ph type="sldNum" sz="quarter" idx="4"/>
-          </p:nvPr>
-        </p:nvSpPr>
-        <p:spPr/>
-        <p:txBody>
-          <a:bodyPr/>
-          <a:lstStyle/>
-          <a:p>
-            <a:fld id="{4E94CFA2-DDEE-4F46-AAD3-48DE685EA116}" type="slidenum">
-              <a:rPr lang="de-DE" smtClean="0"/>
-              <a:pPr/>
-              <a:t>7</a:t>
-            </a:fld>
-            <a:endParaRPr lang="de-DE" dirty="0"/>
-          </a:p>
-        </p:txBody>
-      </p:sp>
-    </p:spTree>
-    <p:extLst>
-      <p:ext uri="{BB962C8B-B14F-4D97-AF65-F5344CB8AC3E}">
-        <p14:creationId xmlns:p14="http://schemas.microsoft.com/office/powerpoint/2010/main" val="2998839140"/>
-      </p:ext>
-    </p:extLst>
-  </p:cSld>
-  <p:clrMapOvr>
-    <a:masterClrMapping/>
-  </p:clrMapOvr>
-</p:sld>
-</file>
-
-<file path=ppt/slides/slide8.xml><?xml version="1.0" encoding="utf-8"?>
-<p:sld xmlns:a="http://schemas.openxmlformats.org/drawingml/2006/main" xmlns:r="http://schemas.openxmlformats.org/officeDocument/2006/relationships" xmlns:p="http://schemas.openxmlformats.org/presentationml/2006/main">
-  <p:cSld>
-    <p:spTree>
-      <p:nvGrpSpPr>
-        <p:cNvPr id="1" name="">
-          <a:extLst>
-            <a:ext uri="{FF2B5EF4-FFF2-40B4-BE49-F238E27FC236}">
-              <a16:creationId xmlns:a16="http://schemas.microsoft.com/office/drawing/2014/main" id="{43401B72-5419-3196-00C9-915AC941F7DD}"/>
-            </a:ext>
-          </a:extLst>
-        </p:cNvPr>
-        <p:cNvGrpSpPr/>
-        <p:nvPr/>
-      </p:nvGrpSpPr>
-      <p:grpSpPr>
-        <a:xfrm>
-          <a:off x="0" y="0"/>
-          <a:ext cx="0" cy="0"/>
-          <a:chOff x="0" y="0"/>
-          <a:chExt cx="0" cy="0"/>
-        </a:xfrm>
-      </p:grpSpPr>
-      <p:sp>
-        <p:nvSpPr>
-          <p:cNvPr id="5" name="Titel 4">
-            <a:extLst>
-              <a:ext uri="{FF2B5EF4-FFF2-40B4-BE49-F238E27FC236}">
-                <a16:creationId xmlns:a16="http://schemas.microsoft.com/office/drawing/2014/main" id="{FE111779-F787-A345-7D81-95CE56CC6529}"/>
-              </a:ext>
-            </a:extLst>
-          </p:cNvPr>
-          <p:cNvSpPr>
-            <a:spLocks noGrp="1"/>
-          </p:cNvSpPr>
-          <p:nvPr>
-            <p:ph type="title"/>
-          </p:nvPr>
-        </p:nvSpPr>
-        <p:spPr/>
-        <p:txBody>
-          <a:bodyPr/>
-          <a:lstStyle/>
-          <a:p>
-            <a:r>
-              <a:rPr lang="de-DE" dirty="0"/>
-              <a:t>Connect – Wie komme ich an den Content?</a:t>
-            </a:r>
-          </a:p>
-        </p:txBody>
-      </p:sp>
-      <p:sp>
-        <p:nvSpPr>
-          <p:cNvPr id="3" name="Textplatzhalter 2">
-            <a:extLst>
-              <a:ext uri="{FF2B5EF4-FFF2-40B4-BE49-F238E27FC236}">
-                <a16:creationId xmlns:a16="http://schemas.microsoft.com/office/drawing/2014/main" id="{5B099480-3A8E-107A-FF77-E34E5EC111BD}"/>
-              </a:ext>
-            </a:extLst>
-          </p:cNvPr>
-          <p:cNvSpPr>
-            <a:spLocks noGrp="1"/>
-          </p:cNvSpPr>
-          <p:nvPr>
-            <p:ph type="body" sz="quarter" idx="10"/>
-          </p:nvPr>
-        </p:nvSpPr>
-        <p:spPr>
-          <a:xfrm>
-            <a:off x="542924" y="1851252"/>
-            <a:ext cx="8384945" cy="3365500"/>
-          </a:xfrm>
-        </p:spPr>
-        <p:txBody>
-          <a:bodyPr/>
-          <a:lstStyle/>
-          <a:p>
-            <a:pPr lvl="1"/>
-            <a:endParaRPr lang="de-DE" dirty="0"/>
-          </a:p>
-          <a:p>
-            <a:endParaRPr lang="de-DE" dirty="0"/>
-          </a:p>
-          <a:p>
-            <a:endParaRPr lang="de-DE" dirty="0"/>
-          </a:p>
-        </p:txBody>
-      </p:sp>
-      <p:sp>
-        <p:nvSpPr>
-          <p:cNvPr id="13" name="Datumsplatzhalter 12">
-            <a:extLst>
-              <a:ext uri="{FF2B5EF4-FFF2-40B4-BE49-F238E27FC236}">
-                <a16:creationId xmlns:a16="http://schemas.microsoft.com/office/drawing/2014/main" id="{2579B740-B24D-4026-1CCE-9E4222B674B1}"/>
-              </a:ext>
-            </a:extLst>
-          </p:cNvPr>
-          <p:cNvSpPr>
-            <a:spLocks noGrp="1"/>
-          </p:cNvSpPr>
-          <p:nvPr>
-            <p:ph type="dt" sz="half" idx="2"/>
-          </p:nvPr>
-        </p:nvSpPr>
-        <p:spPr>
-          <a:xfrm>
-            <a:off x="2522091" y="6461798"/>
-            <a:ext cx="686365" cy="180000"/>
-          </a:xfrm>
-        </p:spPr>
-        <p:txBody>
-          <a:bodyPr/>
-          <a:lstStyle/>
-          <a:p>
-            <a:fld id="{0E224B17-6BAA-419A-A10E-EF501F5A3EF3}" type="datetime1">
-              <a:rPr lang="de-DE" smtClean="0">
-                <a:solidFill>
-                  <a:srgbClr val="000000"/>
-                </a:solidFill>
-              </a:rPr>
-              <a:t>03.12.2024</a:t>
-            </a:fld>
-            <a:endParaRPr lang="de-DE" dirty="0">
-              <a:solidFill>
-                <a:srgbClr val="000000"/>
-              </a:solidFill>
-            </a:endParaRPr>
-          </a:p>
-        </p:txBody>
-      </p:sp>
-      <p:sp>
-        <p:nvSpPr>
-          <p:cNvPr id="14" name="Fußzeilenplatzhalter 13">
-            <a:extLst>
-              <a:ext uri="{FF2B5EF4-FFF2-40B4-BE49-F238E27FC236}">
-                <a16:creationId xmlns:a16="http://schemas.microsoft.com/office/drawing/2014/main" id="{F24AEC7F-8DBF-57AD-0F91-7D23D2032C53}"/>
-              </a:ext>
-            </a:extLst>
-          </p:cNvPr>
-          <p:cNvSpPr>
-            <a:spLocks noGrp="1"/>
-          </p:cNvSpPr>
-          <p:nvPr>
-            <p:ph type="ftr" sz="quarter" idx="3"/>
-          </p:nvPr>
-        </p:nvSpPr>
-        <p:spPr>
-          <a:xfrm>
-            <a:off x="3298662" y="6463629"/>
-            <a:ext cx="6480000" cy="180000"/>
-          </a:xfrm>
-        </p:spPr>
-        <p:txBody>
-          <a:bodyPr/>
-          <a:lstStyle/>
-          <a:p>
-            <a:r>
-              <a:rPr lang="de-DE">
-                <a:solidFill>
-                  <a:srgbClr val="000000"/>
-                </a:solidFill>
-              </a:rPr>
-              <a:t>ISiK und Krankenhaus Stakeholder</a:t>
-            </a:r>
-            <a:endParaRPr lang="de-DE" dirty="0">
-              <a:solidFill>
-                <a:srgbClr val="000000"/>
-              </a:solidFill>
-            </a:endParaRPr>
-          </a:p>
-        </p:txBody>
-      </p:sp>
-      <p:sp>
-        <p:nvSpPr>
-          <p:cNvPr id="2" name="Foliennummernplatzhalter 1">
-            <a:extLst>
-              <a:ext uri="{FF2B5EF4-FFF2-40B4-BE49-F238E27FC236}">
-                <a16:creationId xmlns:a16="http://schemas.microsoft.com/office/drawing/2014/main" id="{846A3D82-06F7-F029-DCE3-E989FE9438AF}"/>
-              </a:ext>
-            </a:extLst>
-          </p:cNvPr>
-          <p:cNvSpPr>
-            <a:spLocks noGrp="1"/>
-          </p:cNvSpPr>
-          <p:nvPr>
-            <p:ph type="sldNum" sz="quarter" idx="4"/>
-          </p:nvPr>
-        </p:nvSpPr>
-        <p:spPr>
-          <a:xfrm>
-            <a:off x="10956550" y="6493730"/>
-            <a:ext cx="686174" cy="180000"/>
-          </a:xfrm>
-        </p:spPr>
-        <p:txBody>
-          <a:bodyPr/>
-          <a:lstStyle/>
-          <a:p>
-            <a:fld id="{4E94CFA2-DDEE-4F46-AAD3-48DE685EA116}" type="slidenum">
-              <a:rPr lang="de-DE" smtClean="0"/>
-              <a:pPr/>
-              <a:t>8</a:t>
-            </a:fld>
-            <a:endParaRPr lang="de-DE" dirty="0"/>
-          </a:p>
-        </p:txBody>
-      </p:sp>
-      <p:pic>
-        <p:nvPicPr>
-          <p:cNvPr id="6" name="Grafik 5">
-            <a:extLst>
-              <a:ext uri="{FF2B5EF4-FFF2-40B4-BE49-F238E27FC236}">
-                <a16:creationId xmlns:a16="http://schemas.microsoft.com/office/drawing/2014/main" id="{5BFCAF6A-9FD8-1364-01F0-FAE79CDE13A7}"/>
-              </a:ext>
-            </a:extLst>
-          </p:cNvPr>
-          <p:cNvPicPr>
-            <a:picLocks noChangeAspect="1"/>
-          </p:cNvPicPr>
-          <p:nvPr/>
-        </p:nvPicPr>
-        <p:blipFill>
-          <a:blip r:embed="rId2"/>
-          <a:stretch>
-            <a:fillRect/>
-          </a:stretch>
-        </p:blipFill>
-        <p:spPr>
-          <a:xfrm>
-            <a:off x="542924" y="1207589"/>
-            <a:ext cx="10291908" cy="4652825"/>
-          </a:xfrm>
-          <a:prstGeom prst="rect">
-            <a:avLst/>
-          </a:prstGeom>
-        </p:spPr>
-      </p:pic>
-    </p:spTree>
-    <p:extLst>
-      <p:ext uri="{BB962C8B-B14F-4D97-AF65-F5344CB8AC3E}">
-        <p14:creationId xmlns:p14="http://schemas.microsoft.com/office/powerpoint/2010/main" val="2090994985"/>
-      </p:ext>
-    </p:extLst>
-  </p:cSld>
-  <p:clrMapOvr>
-    <a:masterClrMapping/>
-  </p:clrMapOvr>
-</p:sld>
-</file>
-
-<file path=ppt/slides/slide9.xml><?xml version="1.0" encoding="utf-8"?>
-<p:sld xmlns:a="http://schemas.openxmlformats.org/drawingml/2006/main" xmlns:r="http://schemas.openxmlformats.org/officeDocument/2006/relationships" xmlns:p="http://schemas.openxmlformats.org/presentationml/2006/main">
-  <p:cSld>
-    <p:spTree>
-      <p:nvGrpSpPr>
-        <p:cNvPr id="1" name="">
-          <a:extLst>
-            <a:ext uri="{FF2B5EF4-FFF2-40B4-BE49-F238E27FC236}">
-              <a16:creationId xmlns:a16="http://schemas.microsoft.com/office/drawing/2014/main" id="{FE72BE7F-A52C-41D9-25A2-45C32A956D96}"/>
-            </a:ext>
-          </a:extLst>
-        </p:cNvPr>
-        <p:cNvGrpSpPr/>
-        <p:nvPr/>
-      </p:nvGrpSpPr>
-      <p:grpSpPr>
-        <a:xfrm>
-          <a:off x="0" y="0"/>
-          <a:ext cx="0" cy="0"/>
-          <a:chOff x="0" y="0"/>
-          <a:chExt cx="0" cy="0"/>
-        </a:xfrm>
-      </p:grpSpPr>
-      <p:sp>
-        <p:nvSpPr>
-          <p:cNvPr id="5" name="Titel 4">
-            <a:extLst>
-              <a:ext uri="{FF2B5EF4-FFF2-40B4-BE49-F238E27FC236}">
-                <a16:creationId xmlns:a16="http://schemas.microsoft.com/office/drawing/2014/main" id="{464F699C-DBF9-46AE-4DB8-331147906787}"/>
-              </a:ext>
-            </a:extLst>
-          </p:cNvPr>
-          <p:cNvSpPr>
-            <a:spLocks noGrp="1"/>
-          </p:cNvSpPr>
-          <p:nvPr>
-            <p:ph type="title"/>
-          </p:nvPr>
-        </p:nvSpPr>
-        <p:spPr/>
-        <p:txBody>
-          <a:bodyPr/>
-          <a:lstStyle/>
-          <a:p>
-            <a:r>
-              <a:rPr lang="de-DE" dirty="0"/>
-              <a:t>Fazit</a:t>
-            </a:r>
-          </a:p>
-        </p:txBody>
-      </p:sp>
-      <p:sp>
-        <p:nvSpPr>
-          <p:cNvPr id="3" name="Textplatzhalter 2">
-            <a:extLst>
-              <a:ext uri="{FF2B5EF4-FFF2-40B4-BE49-F238E27FC236}">
-                <a16:creationId xmlns:a16="http://schemas.microsoft.com/office/drawing/2014/main" id="{070AF782-0E35-1276-56C0-8634FECD0F20}"/>
-              </a:ext>
-            </a:extLst>
-          </p:cNvPr>
-          <p:cNvSpPr>
-            <a:spLocks noGrp="1"/>
-          </p:cNvSpPr>
-          <p:nvPr>
-            <p:ph type="body" sz="quarter" idx="10"/>
-          </p:nvPr>
-        </p:nvSpPr>
-        <p:spPr>
-          <a:xfrm>
-            <a:off x="542924" y="1851252"/>
-            <a:ext cx="8384945" cy="3365500"/>
-          </a:xfrm>
-        </p:spPr>
-        <p:txBody>
-          <a:bodyPr/>
-          <a:lstStyle/>
-          <a:p>
-            <a:r>
-              <a:rPr lang="de-DE" dirty="0"/>
-              <a:t>Was wir erreicht haben</a:t>
-            </a:r>
-          </a:p>
-          <a:p>
-            <a:r>
-              <a:rPr lang="de-DE" dirty="0"/>
-              <a:t>Was wir gelernt haben</a:t>
-            </a:r>
-          </a:p>
-          <a:p>
-            <a:r>
-              <a:rPr lang="de-DE" dirty="0"/>
-              <a:t>Was können und wissen wir noch nicht?</a:t>
-            </a:r>
-          </a:p>
-          <a:p>
-            <a:endParaRPr lang="de-DE" dirty="0"/>
-          </a:p>
-          <a:p>
-            <a:endParaRPr lang="de-DE" dirty="0"/>
-          </a:p>
-        </p:txBody>
-      </p:sp>
-      <p:sp>
-        <p:nvSpPr>
-          <p:cNvPr id="13" name="Datumsplatzhalter 12">
-            <a:extLst>
-              <a:ext uri="{FF2B5EF4-FFF2-40B4-BE49-F238E27FC236}">
-                <a16:creationId xmlns:a16="http://schemas.microsoft.com/office/drawing/2014/main" id="{43A9F52A-B322-483C-022F-9D527EAB0C1A}"/>
-              </a:ext>
-            </a:extLst>
-          </p:cNvPr>
-          <p:cNvSpPr>
-            <a:spLocks noGrp="1"/>
-          </p:cNvSpPr>
-          <p:nvPr>
-            <p:ph type="dt" sz="half" idx="2"/>
-          </p:nvPr>
-        </p:nvSpPr>
-        <p:spPr>
-          <a:xfrm>
-            <a:off x="2522091" y="6461798"/>
-            <a:ext cx="686365" cy="180000"/>
-          </a:xfrm>
-        </p:spPr>
-        <p:txBody>
-          <a:bodyPr/>
-          <a:lstStyle/>
-          <a:p>
-            <a:fld id="{0E224B17-6BAA-419A-A10E-EF501F5A3EF3}" type="datetime1">
-              <a:rPr lang="de-DE" smtClean="0">
-                <a:solidFill>
-                  <a:srgbClr val="000000"/>
-                </a:solidFill>
-              </a:rPr>
-              <a:t>03.12.2024</a:t>
-            </a:fld>
-            <a:endParaRPr lang="de-DE" dirty="0">
-              <a:solidFill>
-                <a:srgbClr val="000000"/>
-              </a:solidFill>
-            </a:endParaRPr>
-          </a:p>
-        </p:txBody>
-      </p:sp>
-      <p:sp>
-        <p:nvSpPr>
-          <p:cNvPr id="14" name="Fußzeilenplatzhalter 13">
-            <a:extLst>
-              <a:ext uri="{FF2B5EF4-FFF2-40B4-BE49-F238E27FC236}">
-                <a16:creationId xmlns:a16="http://schemas.microsoft.com/office/drawing/2014/main" id="{E650C4B4-DF63-BEAE-BEDC-392ABBA00B80}"/>
-              </a:ext>
-            </a:extLst>
-          </p:cNvPr>
-          <p:cNvSpPr>
-            <a:spLocks noGrp="1"/>
-          </p:cNvSpPr>
-          <p:nvPr>
-            <p:ph type="ftr" sz="quarter" idx="3"/>
-          </p:nvPr>
-        </p:nvSpPr>
-        <p:spPr>
-          <a:xfrm>
-            <a:off x="3298662" y="6463629"/>
-            <a:ext cx="6480000" cy="180000"/>
-          </a:xfrm>
-        </p:spPr>
-        <p:txBody>
-          <a:bodyPr/>
-          <a:lstStyle/>
-          <a:p>
-            <a:r>
-              <a:rPr lang="de-DE">
-                <a:solidFill>
-                  <a:srgbClr val="000000"/>
-                </a:solidFill>
-              </a:rPr>
-              <a:t>ISiK und Krankenhaus Stakeholder</a:t>
-            </a:r>
-            <a:endParaRPr lang="de-DE" dirty="0">
-              <a:solidFill>
-                <a:srgbClr val="000000"/>
-              </a:solidFill>
-            </a:endParaRPr>
-          </a:p>
-        </p:txBody>
-      </p:sp>
-      <p:sp>
-        <p:nvSpPr>
-          <p:cNvPr id="2" name="Foliennummernplatzhalter 1">
-            <a:extLst>
-              <a:ext uri="{FF2B5EF4-FFF2-40B4-BE49-F238E27FC236}">
-                <a16:creationId xmlns:a16="http://schemas.microsoft.com/office/drawing/2014/main" id="{1701C184-DD04-7183-DCDF-E7EA5236062F}"/>
-              </a:ext>
-            </a:extLst>
-          </p:cNvPr>
-          <p:cNvSpPr>
-            <a:spLocks noGrp="1"/>
-          </p:cNvSpPr>
-          <p:nvPr>
-            <p:ph type="sldNum" sz="quarter" idx="4"/>
-          </p:nvPr>
-        </p:nvSpPr>
-        <p:spPr>
-          <a:xfrm>
-            <a:off x="10956550" y="6493730"/>
-            <a:ext cx="686174" cy="180000"/>
-          </a:xfrm>
-        </p:spPr>
-        <p:txBody>
-          <a:bodyPr/>
-          <a:lstStyle/>
-          <a:p>
-            <a:fld id="{4E94CFA2-DDEE-4F46-AAD3-48DE685EA116}" type="slidenum">
-              <a:rPr lang="de-DE" smtClean="0"/>
-              <a:pPr/>
-              <a:t>9</a:t>
-            </a:fld>
-            <a:endParaRPr lang="de-DE" dirty="0"/>
-          </a:p>
-        </p:txBody>
-      </p:sp>
-    </p:spTree>
-    <p:extLst>
-      <p:ext uri="{BB962C8B-B14F-4D97-AF65-F5344CB8AC3E}">
-        <p14:creationId xmlns:p14="http://schemas.microsoft.com/office/powerpoint/2010/main" val="1265481475"/>
       </p:ext>
     </p:extLst>
   </p:cSld>
@@ -30658,15 +31910,6 @@
 </file>
 
 <file path=customXml/item1.xml><?xml version="1.0" encoding="utf-8"?>
-<?mso-contentType ?>
-<FormTemplates xmlns="http://schemas.microsoft.com/sharepoint/v3/contenttype/forms">
-  <Display>DocumentLibraryForm</Display>
-  <Edit>DocumentLibraryForm</Edit>
-  <New>DocumentLibraryForm</New>
-</FormTemplates>
-</file>
-
-<file path=customXml/item2.xml><?xml version="1.0" encoding="utf-8"?>
 <ct:contentTypeSchema xmlns:ct="http://schemas.microsoft.com/office/2006/metadata/contentType" xmlns:ma="http://schemas.microsoft.com/office/2006/metadata/properties/metaAttributes" ct:_="" ma:_="" ma:contentTypeName="Dokument" ma:contentTypeID="0x0101004EA9A5E64653404080C998FC95AC8237" ma:contentTypeVersion="10" ma:contentTypeDescription="Ein neues Dokument erstellen." ma:contentTypeScope="" ma:versionID="4bf9ebeb377078de21246a3d31ddbd6a">
   <xsd:schema xmlns:xsd="http://www.w3.org/2001/XMLSchema" xmlns:xs="http://www.w3.org/2001/XMLSchema" xmlns:p="http://schemas.microsoft.com/office/2006/metadata/properties" xmlns:ns2="50ec2553-5958-46f4-a032-e4feb5253c40" xmlns:ns3="ccb7935e-c147-4231-b808-725f1c5e86d8" targetNamespace="http://schemas.microsoft.com/office/2006/metadata/properties" ma:root="true" ma:fieldsID="450e68f76002d81aecf78c1e30b3d065" ns2:_="" ns3:_="">
     <xsd:import namespace="50ec2553-5958-46f4-a032-e4feb5253c40"/>
@@ -30869,6 +32112,15 @@
 </ct:contentTypeSchema>
 </file>
 
+<file path=customXml/item2.xml><?xml version="1.0" encoding="utf-8"?>
+<?mso-contentType ?>
+<FormTemplates xmlns="http://schemas.microsoft.com/sharepoint/v3/contenttype/forms">
+  <Display>DocumentLibraryForm</Display>
+  <Edit>DocumentLibraryForm</Edit>
+  <New>DocumentLibraryForm</New>
+</FormTemplates>
+</file>
+
 <file path=customXml/item3.xml><?xml version="1.0" encoding="utf-8"?>
 <p:properties xmlns:p="http://schemas.microsoft.com/office/2006/metadata/properties" xmlns:xsi="http://www.w3.org/2001/XMLSchema-instance" xmlns:pc="http://schemas.microsoft.com/office/infopath/2007/PartnerControls">
   <documentManagement/>
@@ -30876,14 +32128,6 @@
 </file>
 
 <file path=customXml/itemProps1.xml><?xml version="1.0" encoding="utf-8"?>
-<ds:datastoreItem xmlns:ds="http://schemas.openxmlformats.org/officeDocument/2006/customXml" ds:itemID="{C52D9559-BA40-44E3-8855-E6DB89ECF033}">
-  <ds:schemaRefs>
-    <ds:schemaRef ds:uri="http://schemas.microsoft.com/sharepoint/v3/contenttype/forms"/>
-  </ds:schemaRefs>
-</ds:datastoreItem>
-</file>
-
-<file path=customXml/itemProps2.xml><?xml version="1.0" encoding="utf-8"?>
 <ds:datastoreItem xmlns:ds="http://schemas.openxmlformats.org/officeDocument/2006/customXml" ds:itemID="{3C85C63A-A19B-4B11-BE01-9FF6A7F40362}">
   <ds:schemaRefs>
     <ds:schemaRef ds:uri="http://schemas.microsoft.com/office/2006/metadata/contentType"/>
@@ -30898,6 +32142,14 @@
     <ds:schemaRef ds:uri="http://purl.org/dc/elements/1.1/"/>
     <ds:schemaRef ds:uri="http://purl.org/dc/terms/"/>
     <ds:schemaRef ds:uri="http://schemas.microsoft.com/internal/obd"/>
+  </ds:schemaRefs>
+</ds:datastoreItem>
+</file>
+
+<file path=customXml/itemProps2.xml><?xml version="1.0" encoding="utf-8"?>
+<ds:datastoreItem xmlns:ds="http://schemas.openxmlformats.org/officeDocument/2006/customXml" ds:itemID="{C52D9559-BA40-44E3-8855-E6DB89ECF033}">
+  <ds:schemaRefs>
+    <ds:schemaRef ds:uri="http://schemas.microsoft.com/sharepoint/v3/contenttype/forms"/>
   </ds:schemaRefs>
 </ds:datastoreItem>
 </file>

</xml_diff>